<commit_message>
Update Test_Plan and Requirements documents
</commit_message>
<xml_diff>
--- a/docs/Requirements.pptx
+++ b/docs/Requirements.pptx
@@ -133,6 +133,130 @@
 </p:presentation>
 </file>
 
+<file path=ppt/commentAuthors.xml><?xml version="1.0" encoding="utf-8"?>
+<p:cmAuthorLst xmlns:a="http://schemas.openxmlformats.org/drawingml/2006/main" xmlns:r="http://schemas.openxmlformats.org/officeDocument/2006/relationships" xmlns:p="http://schemas.openxmlformats.org/presentationml/2006/main">
+  <p:cmAuthor id="1" name="Jonathan Flum" initials="JF" lastIdx="12" clrIdx="0">
+    <p:extLst>
+      <p:ext uri="{19B8F6BF-5375-455C-9EA6-DF929625EA0E}">
+        <p15:presenceInfo xmlns:p15="http://schemas.microsoft.com/office/powerpoint/2012/main" userId="3e98484f77a34245" providerId="Windows Live"/>
+      </p:ext>
+    </p:extLst>
+  </p:cmAuthor>
+</p:cmAuthorLst>
+</file>
+
+<file path=ppt/comments/comment1.xml><?xml version="1.0" encoding="utf-8"?>
+<p:cmLst xmlns:a="http://schemas.openxmlformats.org/drawingml/2006/main" xmlns:r="http://schemas.openxmlformats.org/officeDocument/2006/relationships" xmlns:p="http://schemas.openxmlformats.org/presentationml/2006/main">
+  <p:cm authorId="1" dt="2023-03-27T10:03:12.670" idx="3">
+    <p:pos x="4288" y="1329"/>
+    <p:text>Implemented horizontal bar representation of time remaining as to not further complicate the amount of numerical data displayed.</p:text>
+    <p:extLst>
+      <p:ext uri="{C676402C-5697-4E1C-873F-D02D1690AC5C}">
+        <p15:threadingInfo xmlns:p15="http://schemas.microsoft.com/office/powerpoint/2012/main" timeZoneBias="240"/>
+      </p:ext>
+    </p:extLst>
+  </p:cm>
+</p:cmLst>
+</file>
+
+<file path=ppt/comments/comment2.xml><?xml version="1.0" encoding="utf-8"?>
+<p:cmLst xmlns:a="http://schemas.openxmlformats.org/drawingml/2006/main" xmlns:r="http://schemas.openxmlformats.org/officeDocument/2006/relationships" xmlns:p="http://schemas.openxmlformats.org/presentationml/2006/main">
+  <p:cm authorId="1" dt="2023-03-27T10:04:11.385" idx="4">
+    <p:pos x="4205" y="1329"/>
+    <p:text>Game endstate reached via progressive difficulty, inherently contraining time/round limitations over subsequent round iterations. Static and Freeplay modes are also available, providing alternative limitations (or lack thereof).</p:text>
+    <p:extLst>
+      <p:ext uri="{C676402C-5697-4E1C-873F-D02D1690AC5C}">
+        <p15:threadingInfo xmlns:p15="http://schemas.microsoft.com/office/powerpoint/2012/main" timeZoneBias="240"/>
+      </p:ext>
+    </p:extLst>
+  </p:cm>
+</p:cmLst>
+</file>
+
+<file path=ppt/comments/comment3.xml><?xml version="1.0" encoding="utf-8"?>
+<p:cmLst xmlns:a="http://schemas.openxmlformats.org/drawingml/2006/main" xmlns:r="http://schemas.openxmlformats.org/officeDocument/2006/relationships" xmlns:p="http://schemas.openxmlformats.org/presentationml/2006/main">
+  <p:cm authorId="1" dt="2023-04-06T12:43:21.098" idx="11">
+    <p:pos x="4288" y="395"/>
+    <p:text>Six difficulty level and three game modes are currently available.</p:text>
+    <p:extLst>
+      <p:ext uri="{C676402C-5697-4E1C-873F-D02D1690AC5C}">
+        <p15:threadingInfo xmlns:p15="http://schemas.microsoft.com/office/powerpoint/2012/main" timeZoneBias="240"/>
+      </p:ext>
+    </p:extLst>
+  </p:cm>
+</p:cmLst>
+</file>
+
+<file path=ppt/comments/comment4.xml><?xml version="1.0" encoding="utf-8"?>
+<p:cmLst xmlns:a="http://schemas.openxmlformats.org/drawingml/2006/main" xmlns:r="http://schemas.openxmlformats.org/officeDocument/2006/relationships" xmlns:p="http://schemas.openxmlformats.org/presentationml/2006/main">
+  <p:cm authorId="1" dt="2023-04-06T11:48:07.510" idx="7">
+    <p:pos x="3663" y="1483"/>
+    <p:text>Tutorial documentation (instruction manual) provided, with the addition of free play mode to gain confidence. Interactive tutorial to be implemented in a future version.</p:text>
+    <p:extLst>
+      <p:ext uri="{C676402C-5697-4E1C-873F-D02D1690AC5C}">
+        <p15:threadingInfo xmlns:p15="http://schemas.microsoft.com/office/powerpoint/2012/main" timeZoneBias="240"/>
+      </p:ext>
+    </p:extLst>
+  </p:cm>
+</p:cmLst>
+</file>
+
+<file path=ppt/comments/comment5.xml><?xml version="1.0" encoding="utf-8"?>
+<p:cmLst xmlns:a="http://schemas.openxmlformats.org/drawingml/2006/main" xmlns:r="http://schemas.openxmlformats.org/officeDocument/2006/relationships" xmlns:p="http://schemas.openxmlformats.org/presentationml/2006/main">
+  <p:cm authorId="1" dt="2023-04-06T11:49:31.829" idx="8">
+    <p:pos x="4254" y="395"/>
+    <p:text>Programmatically possible, however fundamentally not suitable for the inteded gameplay.</p:text>
+    <p:extLst>
+      <p:ext uri="{C676402C-5697-4E1C-873F-D02D1690AC5C}">
+        <p15:threadingInfo xmlns:p15="http://schemas.microsoft.com/office/powerpoint/2012/main" timeZoneBias="240"/>
+      </p:ext>
+    </p:extLst>
+  </p:cm>
+</p:cmLst>
+</file>
+
+<file path=ppt/comments/comment6.xml><?xml version="1.0" encoding="utf-8"?>
+<p:cmLst xmlns:a="http://schemas.openxmlformats.org/drawingml/2006/main" xmlns:r="http://schemas.openxmlformats.org/officeDocument/2006/relationships" xmlns:p="http://schemas.openxmlformats.org/presentationml/2006/main">
+  <p:cm authorId="1" dt="2023-04-06T11:50:44.291" idx="9">
+    <p:pos x="4224" y="395"/>
+    <p:text>Implemented text auto-sizing. The largest font point (to a degree) will always be utilized given the amount of text and available field space. Can manually scale elements smaller, though there exists no reason do to given the current permutation bounds.</p:text>
+    <p:extLst>
+      <p:ext uri="{C676402C-5697-4E1C-873F-D02D1690AC5C}">
+        <p15:threadingInfo xmlns:p15="http://schemas.microsoft.com/office/powerpoint/2012/main" timeZoneBias="240"/>
+      </p:ext>
+    </p:extLst>
+  </p:cm>
+</p:cmLst>
+</file>
+
+<file path=ppt/comments/comment7.xml><?xml version="1.0" encoding="utf-8"?>
+<p:cmLst xmlns:a="http://schemas.openxmlformats.org/drawingml/2006/main" xmlns:r="http://schemas.openxmlformats.org/officeDocument/2006/relationships" xmlns:p="http://schemas.openxmlformats.org/presentationml/2006/main">
+  <p:cm authorId="1" dt="2023-04-07T17:08:05.117" idx="12">
+    <p:pos x="3994" y="395"/>
+    <p:text>Actual gameplay enagement timeplay is tracked (i.e. not including menus, etc.). Current implementation reminds user to take a break every 30 minutes, though does not prevent dismissal and continuance.</p:text>
+    <p:extLst>
+      <p:ext uri="{C676402C-5697-4E1C-873F-D02D1690AC5C}">
+        <p15:threadingInfo xmlns:p15="http://schemas.microsoft.com/office/powerpoint/2012/main" timeZoneBias="240"/>
+      </p:ext>
+    </p:extLst>
+  </p:cm>
+</p:cmLst>
+</file>
+
+<file path=ppt/comments/comment8.xml><?xml version="1.0" encoding="utf-8"?>
+<p:cmLst xmlns:a="http://schemas.openxmlformats.org/drawingml/2006/main" xmlns:r="http://schemas.openxmlformats.org/officeDocument/2006/relationships" xmlns:p="http://schemas.openxmlformats.org/presentationml/2006/main">
+  <p:cm authorId="1" dt="2023-04-06T11:54:56.223" idx="10">
+    <p:pos x="4344" y="395"/>
+    <p:text>WebGL browser caching utilized for individual player data, stored locally on the user's machine. A future revision could warrant exportation, aggregation, and therefore a redundancy, should leaderboards, PvP, etc. be indicated.</p:text>
+    <p:extLst>
+      <p:ext uri="{C676402C-5697-4E1C-873F-D02D1690AC5C}">
+        <p15:threadingInfo xmlns:p15="http://schemas.microsoft.com/office/powerpoint/2012/main" timeZoneBias="240"/>
+      </p:ext>
+    </p:extLst>
+  </p:cm>
+</p:cmLst>
+</file>
+
 <file path=ppt/slideLayouts/slideLayout1.xml><?xml version="1.0" encoding="utf-8"?>
 <p:sldLayout xmlns:a="http://schemas.openxmlformats.org/drawingml/2006/main" xmlns:r="http://schemas.openxmlformats.org/officeDocument/2006/relationships" xmlns:p="http://schemas.openxmlformats.org/presentationml/2006/main" type="title" preserve="1">
   <p:cSld name="Title Slide">
@@ -264,7 +388,7 @@
           <a:p>
             <a:fld id="{F26EAA00-1F83-4303-9263-8C4B807B8531}" type="datetimeFigureOut">
               <a:rPr lang="en-US" smtClean="0"/>
-              <a:t>3/30/2022</a:t>
+              <a:t>4/11/2023</a:t>
             </a:fld>
             <a:endParaRPr lang="en-US"/>
           </a:p>
@@ -434,7 +558,7 @@
           <a:p>
             <a:fld id="{F26EAA00-1F83-4303-9263-8C4B807B8531}" type="datetimeFigureOut">
               <a:rPr lang="en-US" smtClean="0"/>
-              <a:t>3/30/2022</a:t>
+              <a:t>4/11/2023</a:t>
             </a:fld>
             <a:endParaRPr lang="en-US"/>
           </a:p>
@@ -614,7 +738,7 @@
           <a:p>
             <a:fld id="{F26EAA00-1F83-4303-9263-8C4B807B8531}" type="datetimeFigureOut">
               <a:rPr lang="en-US" smtClean="0"/>
-              <a:t>3/30/2022</a:t>
+              <a:t>4/11/2023</a:t>
             </a:fld>
             <a:endParaRPr lang="en-US"/>
           </a:p>
@@ -784,7 +908,7 @@
           <a:p>
             <a:fld id="{F26EAA00-1F83-4303-9263-8C4B807B8531}" type="datetimeFigureOut">
               <a:rPr lang="en-US" smtClean="0"/>
-              <a:t>3/30/2022</a:t>
+              <a:t>4/11/2023</a:t>
             </a:fld>
             <a:endParaRPr lang="en-US"/>
           </a:p>
@@ -1030,7 +1154,7 @@
           <a:p>
             <a:fld id="{F26EAA00-1F83-4303-9263-8C4B807B8531}" type="datetimeFigureOut">
               <a:rPr lang="en-US" smtClean="0"/>
-              <a:t>3/30/2022</a:t>
+              <a:t>4/11/2023</a:t>
             </a:fld>
             <a:endParaRPr lang="en-US"/>
           </a:p>
@@ -1262,7 +1386,7 @@
           <a:p>
             <a:fld id="{F26EAA00-1F83-4303-9263-8C4B807B8531}" type="datetimeFigureOut">
               <a:rPr lang="en-US" smtClean="0"/>
-              <a:t>3/30/2022</a:t>
+              <a:t>4/11/2023</a:t>
             </a:fld>
             <a:endParaRPr lang="en-US"/>
           </a:p>
@@ -1629,7 +1753,7 @@
           <a:p>
             <a:fld id="{F26EAA00-1F83-4303-9263-8C4B807B8531}" type="datetimeFigureOut">
               <a:rPr lang="en-US" smtClean="0"/>
-              <a:t>3/30/2022</a:t>
+              <a:t>4/11/2023</a:t>
             </a:fld>
             <a:endParaRPr lang="en-US"/>
           </a:p>
@@ -1747,7 +1871,7 @@
           <a:p>
             <a:fld id="{F26EAA00-1F83-4303-9263-8C4B807B8531}" type="datetimeFigureOut">
               <a:rPr lang="en-US" smtClean="0"/>
-              <a:t>3/30/2022</a:t>
+              <a:t>4/11/2023</a:t>
             </a:fld>
             <a:endParaRPr lang="en-US"/>
           </a:p>
@@ -1842,7 +1966,7 @@
           <a:p>
             <a:fld id="{F26EAA00-1F83-4303-9263-8C4B807B8531}" type="datetimeFigureOut">
               <a:rPr lang="en-US" smtClean="0"/>
-              <a:t>3/30/2022</a:t>
+              <a:t>4/11/2023</a:t>
             </a:fld>
             <a:endParaRPr lang="en-US"/>
           </a:p>
@@ -2119,7 +2243,7 @@
           <a:p>
             <a:fld id="{F26EAA00-1F83-4303-9263-8C4B807B8531}" type="datetimeFigureOut">
               <a:rPr lang="en-US" smtClean="0"/>
-              <a:t>3/30/2022</a:t>
+              <a:t>4/11/2023</a:t>
             </a:fld>
             <a:endParaRPr lang="en-US"/>
           </a:p>
@@ -2376,7 +2500,7 @@
           <a:p>
             <a:fld id="{F26EAA00-1F83-4303-9263-8C4B807B8531}" type="datetimeFigureOut">
               <a:rPr lang="en-US" smtClean="0"/>
-              <a:t>3/30/2022</a:t>
+              <a:t>4/11/2023</a:t>
             </a:fld>
             <a:endParaRPr lang="en-US"/>
           </a:p>
@@ -2589,7 +2713,7 @@
           <a:p>
             <a:fld id="{F26EAA00-1F83-4303-9263-8C4B807B8531}" type="datetimeFigureOut">
               <a:rPr lang="en-US" smtClean="0"/>
-              <a:t>3/30/2022</a:t>
+              <a:t>4/11/2023</a:t>
             </a:fld>
             <a:endParaRPr lang="en-US"/>
           </a:p>
@@ -3430,6 +3554,58 @@
           </a:p>
         </p:txBody>
       </p:sp>
+      <p:sp>
+        <p:nvSpPr>
+          <p:cNvPr id="2" name="Oval 1">
+            <a:extLst>
+              <a:ext uri="{FF2B5EF4-FFF2-40B4-BE49-F238E27FC236}">
+                <a16:creationId xmlns:a16="http://schemas.microsoft.com/office/drawing/2014/main" id="{25DF1531-3F16-4237-8244-98B8BC12C54D}"/>
+              </a:ext>
+            </a:extLst>
+          </p:cNvPr>
+          <p:cNvSpPr/>
+          <p:nvPr/>
+        </p:nvSpPr>
+        <p:spPr>
+          <a:xfrm>
+            <a:off x="6835147" y="142614"/>
+            <a:ext cx="338554" cy="338554"/>
+          </a:xfrm>
+          <a:prstGeom prst="ellipse">
+            <a:avLst/>
+          </a:prstGeom>
+          <a:solidFill>
+            <a:schemeClr val="accent6"/>
+          </a:solidFill>
+          <a:ln>
+            <a:noFill/>
+          </a:ln>
+        </p:spPr>
+        <p:style>
+          <a:lnRef idx="2">
+            <a:schemeClr val="accent1">
+              <a:shade val="50000"/>
+            </a:schemeClr>
+          </a:lnRef>
+          <a:fillRef idx="1">
+            <a:schemeClr val="accent1"/>
+          </a:fillRef>
+          <a:effectRef idx="0">
+            <a:schemeClr val="accent1"/>
+          </a:effectRef>
+          <a:fontRef idx="minor">
+            <a:schemeClr val="lt1"/>
+          </a:fontRef>
+        </p:style>
+        <p:txBody>
+          <a:bodyPr rtlCol="0" anchor="ctr"/>
+          <a:lstStyle/>
+          <a:p>
+            <a:pPr algn="ctr"/>
+            <a:endParaRPr lang="en-US"/>
+          </a:p>
+        </p:txBody>
+      </p:sp>
     </p:spTree>
     <p:extLst>
       <p:ext uri="{BB962C8B-B14F-4D97-AF65-F5344CB8AC3E}">
@@ -4268,6 +4444,56 @@
           </a:p>
         </p:txBody>
       </p:sp>
+      <p:sp>
+        <p:nvSpPr>
+          <p:cNvPr id="19" name="Oval 18">
+            <a:extLst>
+              <a:ext uri="{FF2B5EF4-FFF2-40B4-BE49-F238E27FC236}">
+                <a16:creationId xmlns:a16="http://schemas.microsoft.com/office/drawing/2014/main" id="{F2569E09-9EE4-4EB8-B8F5-E82C7715DC65}"/>
+              </a:ext>
+            </a:extLst>
+          </p:cNvPr>
+          <p:cNvSpPr/>
+          <p:nvPr/>
+        </p:nvSpPr>
+        <p:spPr>
+          <a:xfrm>
+            <a:off x="6835147" y="142614"/>
+            <a:ext cx="338554" cy="338554"/>
+          </a:xfrm>
+          <a:prstGeom prst="ellipse">
+            <a:avLst/>
+          </a:prstGeom>
+          <a:solidFill>
+            <a:schemeClr val="accent6"/>
+          </a:solidFill>
+          <a:ln>
+            <a:noFill/>
+          </a:ln>
+        </p:spPr>
+        <p:style>
+          <a:lnRef idx="0">
+            <a:scrgbClr r="0" g="0" b="0"/>
+          </a:lnRef>
+          <a:fillRef idx="0">
+            <a:scrgbClr r="0" g="0" b="0"/>
+          </a:fillRef>
+          <a:effectRef idx="0">
+            <a:scrgbClr r="0" g="0" b="0"/>
+          </a:effectRef>
+          <a:fontRef idx="minor">
+            <a:schemeClr val="lt1"/>
+          </a:fontRef>
+        </p:style>
+        <p:txBody>
+          <a:bodyPr rtlCol="0" anchor="ctr"/>
+          <a:lstStyle/>
+          <a:p>
+            <a:pPr algn="ctr"/>
+            <a:endParaRPr lang="en-US"/>
+          </a:p>
+        </p:txBody>
+      </p:sp>
     </p:spTree>
     <p:extLst>
       <p:ext uri="{BB962C8B-B14F-4D97-AF65-F5344CB8AC3E}">
@@ -5129,6 +5355,56 @@
           </a:p>
         </p:txBody>
       </p:sp>
+      <p:sp>
+        <p:nvSpPr>
+          <p:cNvPr id="19" name="Oval 18">
+            <a:extLst>
+              <a:ext uri="{FF2B5EF4-FFF2-40B4-BE49-F238E27FC236}">
+                <a16:creationId xmlns:a16="http://schemas.microsoft.com/office/drawing/2014/main" id="{F36F7F88-2068-4240-AA72-C3D49C4C31D3}"/>
+              </a:ext>
+            </a:extLst>
+          </p:cNvPr>
+          <p:cNvSpPr/>
+          <p:nvPr/>
+        </p:nvSpPr>
+        <p:spPr>
+          <a:xfrm>
+            <a:off x="6835147" y="142614"/>
+            <a:ext cx="338554" cy="338554"/>
+          </a:xfrm>
+          <a:prstGeom prst="ellipse">
+            <a:avLst/>
+          </a:prstGeom>
+          <a:solidFill>
+            <a:schemeClr val="accent4"/>
+          </a:solidFill>
+          <a:ln>
+            <a:noFill/>
+          </a:ln>
+        </p:spPr>
+        <p:style>
+          <a:lnRef idx="0">
+            <a:scrgbClr r="0" g="0" b="0"/>
+          </a:lnRef>
+          <a:fillRef idx="0">
+            <a:scrgbClr r="0" g="0" b="0"/>
+          </a:fillRef>
+          <a:effectRef idx="0">
+            <a:scrgbClr r="0" g="0" b="0"/>
+          </a:effectRef>
+          <a:fontRef idx="minor">
+            <a:schemeClr val="lt1"/>
+          </a:fontRef>
+        </p:style>
+        <p:txBody>
+          <a:bodyPr rtlCol="0" anchor="ctr"/>
+          <a:lstStyle/>
+          <a:p>
+            <a:pPr algn="ctr"/>
+            <a:endParaRPr lang="en-US"/>
+          </a:p>
+        </p:txBody>
+      </p:sp>
     </p:spTree>
     <p:extLst>
       <p:ext uri="{BB962C8B-B14F-4D97-AF65-F5344CB8AC3E}">
@@ -5967,6 +6243,56 @@
           </a:p>
         </p:txBody>
       </p:sp>
+      <p:sp>
+        <p:nvSpPr>
+          <p:cNvPr id="19" name="Oval 18">
+            <a:extLst>
+              <a:ext uri="{FF2B5EF4-FFF2-40B4-BE49-F238E27FC236}">
+                <a16:creationId xmlns:a16="http://schemas.microsoft.com/office/drawing/2014/main" id="{52101CCE-1E61-4B18-AF0A-E3C8EF5861B2}"/>
+              </a:ext>
+            </a:extLst>
+          </p:cNvPr>
+          <p:cNvSpPr/>
+          <p:nvPr/>
+        </p:nvSpPr>
+        <p:spPr>
+          <a:xfrm>
+            <a:off x="6835147" y="142614"/>
+            <a:ext cx="338554" cy="338554"/>
+          </a:xfrm>
+          <a:prstGeom prst="ellipse">
+            <a:avLst/>
+          </a:prstGeom>
+          <a:solidFill>
+            <a:schemeClr val="accent6"/>
+          </a:solidFill>
+          <a:ln>
+            <a:noFill/>
+          </a:ln>
+        </p:spPr>
+        <p:style>
+          <a:lnRef idx="0">
+            <a:scrgbClr r="0" g="0" b="0"/>
+          </a:lnRef>
+          <a:fillRef idx="0">
+            <a:scrgbClr r="0" g="0" b="0"/>
+          </a:fillRef>
+          <a:effectRef idx="0">
+            <a:scrgbClr r="0" g="0" b="0"/>
+          </a:effectRef>
+          <a:fontRef idx="minor">
+            <a:schemeClr val="lt1"/>
+          </a:fontRef>
+        </p:style>
+        <p:txBody>
+          <a:bodyPr rtlCol="0" anchor="ctr"/>
+          <a:lstStyle/>
+          <a:p>
+            <a:pPr algn="ctr"/>
+            <a:endParaRPr lang="en-US"/>
+          </a:p>
+        </p:txBody>
+      </p:sp>
     </p:spTree>
     <p:extLst>
       <p:ext uri="{BB962C8B-B14F-4D97-AF65-F5344CB8AC3E}">
@@ -6814,6 +7140,56 @@
           </a:p>
         </p:txBody>
       </p:sp>
+      <p:sp>
+        <p:nvSpPr>
+          <p:cNvPr id="19" name="Oval 18">
+            <a:extLst>
+              <a:ext uri="{FF2B5EF4-FFF2-40B4-BE49-F238E27FC236}">
+                <a16:creationId xmlns:a16="http://schemas.microsoft.com/office/drawing/2014/main" id="{2CF07D7A-0B96-41C9-84F8-8539B977A4E1}"/>
+              </a:ext>
+            </a:extLst>
+          </p:cNvPr>
+          <p:cNvSpPr/>
+          <p:nvPr/>
+        </p:nvSpPr>
+        <p:spPr>
+          <a:xfrm>
+            <a:off x="6835147" y="142614"/>
+            <a:ext cx="338554" cy="338554"/>
+          </a:xfrm>
+          <a:prstGeom prst="ellipse">
+            <a:avLst/>
+          </a:prstGeom>
+          <a:solidFill>
+            <a:schemeClr val="accent2"/>
+          </a:solidFill>
+          <a:ln>
+            <a:noFill/>
+          </a:ln>
+        </p:spPr>
+        <p:style>
+          <a:lnRef idx="0">
+            <a:scrgbClr r="0" g="0" b="0"/>
+          </a:lnRef>
+          <a:fillRef idx="0">
+            <a:scrgbClr r="0" g="0" b="0"/>
+          </a:fillRef>
+          <a:effectRef idx="0">
+            <a:scrgbClr r="0" g="0" b="0"/>
+          </a:effectRef>
+          <a:fontRef idx="minor">
+            <a:schemeClr val="lt1"/>
+          </a:fontRef>
+        </p:style>
+        <p:txBody>
+          <a:bodyPr rtlCol="0" anchor="ctr"/>
+          <a:lstStyle/>
+          <a:p>
+            <a:pPr algn="ctr"/>
+            <a:endParaRPr lang="en-US"/>
+          </a:p>
+        </p:txBody>
+      </p:sp>
     </p:spTree>
     <p:extLst>
       <p:ext uri="{BB962C8B-B14F-4D97-AF65-F5344CB8AC3E}">
@@ -7640,6 +8016,56 @@
           </a:p>
         </p:txBody>
       </p:sp>
+      <p:sp>
+        <p:nvSpPr>
+          <p:cNvPr id="19" name="Oval 18">
+            <a:extLst>
+              <a:ext uri="{FF2B5EF4-FFF2-40B4-BE49-F238E27FC236}">
+                <a16:creationId xmlns:a16="http://schemas.microsoft.com/office/drawing/2014/main" id="{5A944349-AD9B-4B1E-B94A-989DD2D9DD04}"/>
+              </a:ext>
+            </a:extLst>
+          </p:cNvPr>
+          <p:cNvSpPr/>
+          <p:nvPr/>
+        </p:nvSpPr>
+        <p:spPr>
+          <a:xfrm>
+            <a:off x="6835147" y="142614"/>
+            <a:ext cx="338554" cy="338554"/>
+          </a:xfrm>
+          <a:prstGeom prst="ellipse">
+            <a:avLst/>
+          </a:prstGeom>
+          <a:solidFill>
+            <a:schemeClr val="accent6"/>
+          </a:solidFill>
+          <a:ln>
+            <a:noFill/>
+          </a:ln>
+        </p:spPr>
+        <p:style>
+          <a:lnRef idx="0">
+            <a:scrgbClr r="0" g="0" b="0"/>
+          </a:lnRef>
+          <a:fillRef idx="0">
+            <a:scrgbClr r="0" g="0" b="0"/>
+          </a:fillRef>
+          <a:effectRef idx="0">
+            <a:scrgbClr r="0" g="0" b="0"/>
+          </a:effectRef>
+          <a:fontRef idx="minor">
+            <a:schemeClr val="lt1"/>
+          </a:fontRef>
+        </p:style>
+        <p:txBody>
+          <a:bodyPr rtlCol="0" anchor="ctr"/>
+          <a:lstStyle/>
+          <a:p>
+            <a:pPr algn="ctr"/>
+            <a:endParaRPr lang="en-US"/>
+          </a:p>
+        </p:txBody>
+      </p:sp>
     </p:spTree>
     <p:extLst>
       <p:ext uri="{BB962C8B-B14F-4D97-AF65-F5344CB8AC3E}">
@@ -8504,6 +8930,56 @@
           </a:p>
         </p:txBody>
       </p:sp>
+      <p:sp>
+        <p:nvSpPr>
+          <p:cNvPr id="19" name="Oval 18">
+            <a:extLst>
+              <a:ext uri="{FF2B5EF4-FFF2-40B4-BE49-F238E27FC236}">
+                <a16:creationId xmlns:a16="http://schemas.microsoft.com/office/drawing/2014/main" id="{0D1C0E97-38CE-4758-B00E-2BCEB05C55D2}"/>
+              </a:ext>
+            </a:extLst>
+          </p:cNvPr>
+          <p:cNvSpPr/>
+          <p:nvPr/>
+        </p:nvSpPr>
+        <p:spPr>
+          <a:xfrm>
+            <a:off x="6835147" y="142614"/>
+            <a:ext cx="338554" cy="338554"/>
+          </a:xfrm>
+          <a:prstGeom prst="ellipse">
+            <a:avLst/>
+          </a:prstGeom>
+          <a:solidFill>
+            <a:schemeClr val="accent6"/>
+          </a:solidFill>
+          <a:ln>
+            <a:noFill/>
+          </a:ln>
+        </p:spPr>
+        <p:style>
+          <a:lnRef idx="0">
+            <a:scrgbClr r="0" g="0" b="0"/>
+          </a:lnRef>
+          <a:fillRef idx="0">
+            <a:scrgbClr r="0" g="0" b="0"/>
+          </a:fillRef>
+          <a:effectRef idx="0">
+            <a:scrgbClr r="0" g="0" b="0"/>
+          </a:effectRef>
+          <a:fontRef idx="minor">
+            <a:schemeClr val="lt1"/>
+          </a:fontRef>
+        </p:style>
+        <p:txBody>
+          <a:bodyPr rtlCol="0" anchor="ctr"/>
+          <a:lstStyle/>
+          <a:p>
+            <a:pPr algn="ctr"/>
+            <a:endParaRPr lang="en-US"/>
+          </a:p>
+        </p:txBody>
+      </p:sp>
     </p:spTree>
     <p:extLst>
       <p:ext uri="{BB962C8B-B14F-4D97-AF65-F5344CB8AC3E}">
@@ -9330,6 +9806,56 @@
           </a:p>
         </p:txBody>
       </p:sp>
+      <p:sp>
+        <p:nvSpPr>
+          <p:cNvPr id="19" name="Oval 18">
+            <a:extLst>
+              <a:ext uri="{FF2B5EF4-FFF2-40B4-BE49-F238E27FC236}">
+                <a16:creationId xmlns:a16="http://schemas.microsoft.com/office/drawing/2014/main" id="{0E4456EA-EFB2-43E8-A488-3FA82FE15573}"/>
+              </a:ext>
+            </a:extLst>
+          </p:cNvPr>
+          <p:cNvSpPr/>
+          <p:nvPr/>
+        </p:nvSpPr>
+        <p:spPr>
+          <a:xfrm>
+            <a:off x="6835147" y="142614"/>
+            <a:ext cx="338554" cy="338554"/>
+          </a:xfrm>
+          <a:prstGeom prst="ellipse">
+            <a:avLst/>
+          </a:prstGeom>
+          <a:solidFill>
+            <a:schemeClr val="accent3"/>
+          </a:solidFill>
+          <a:ln>
+            <a:noFill/>
+          </a:ln>
+        </p:spPr>
+        <p:style>
+          <a:lnRef idx="0">
+            <a:scrgbClr r="0" g="0" b="0"/>
+          </a:lnRef>
+          <a:fillRef idx="0">
+            <a:scrgbClr r="0" g="0" b="0"/>
+          </a:fillRef>
+          <a:effectRef idx="0">
+            <a:scrgbClr r="0" g="0" b="0"/>
+          </a:effectRef>
+          <a:fontRef idx="minor">
+            <a:schemeClr val="lt1"/>
+          </a:fontRef>
+        </p:style>
+        <p:txBody>
+          <a:bodyPr rtlCol="0" anchor="ctr"/>
+          <a:lstStyle/>
+          <a:p>
+            <a:pPr algn="ctr"/>
+            <a:endParaRPr lang="en-US"/>
+          </a:p>
+        </p:txBody>
+      </p:sp>
     </p:spTree>
     <p:extLst>
       <p:ext uri="{BB962C8B-B14F-4D97-AF65-F5344CB8AC3E}">
@@ -10229,6 +10755,56 @@
           </a:p>
         </p:txBody>
       </p:sp>
+      <p:sp>
+        <p:nvSpPr>
+          <p:cNvPr id="19" name="Oval 18">
+            <a:extLst>
+              <a:ext uri="{FF2B5EF4-FFF2-40B4-BE49-F238E27FC236}">
+                <a16:creationId xmlns:a16="http://schemas.microsoft.com/office/drawing/2014/main" id="{3EEA85D4-2FC3-4142-891F-FA11F8D9F59B}"/>
+              </a:ext>
+            </a:extLst>
+          </p:cNvPr>
+          <p:cNvSpPr/>
+          <p:nvPr/>
+        </p:nvSpPr>
+        <p:spPr>
+          <a:xfrm>
+            <a:off x="6835147" y="142614"/>
+            <a:ext cx="338554" cy="338554"/>
+          </a:xfrm>
+          <a:prstGeom prst="ellipse">
+            <a:avLst/>
+          </a:prstGeom>
+          <a:solidFill>
+            <a:schemeClr val="accent6"/>
+          </a:solidFill>
+          <a:ln>
+            <a:noFill/>
+          </a:ln>
+        </p:spPr>
+        <p:style>
+          <a:lnRef idx="0">
+            <a:scrgbClr r="0" g="0" b="0"/>
+          </a:lnRef>
+          <a:fillRef idx="0">
+            <a:scrgbClr r="0" g="0" b="0"/>
+          </a:fillRef>
+          <a:effectRef idx="0">
+            <a:scrgbClr r="0" g="0" b="0"/>
+          </a:effectRef>
+          <a:fontRef idx="minor">
+            <a:schemeClr val="lt1"/>
+          </a:fontRef>
+        </p:style>
+        <p:txBody>
+          <a:bodyPr rtlCol="0" anchor="ctr"/>
+          <a:lstStyle/>
+          <a:p>
+            <a:pPr algn="ctr"/>
+            <a:endParaRPr lang="en-US"/>
+          </a:p>
+        </p:txBody>
+      </p:sp>
     </p:spTree>
     <p:extLst>
       <p:ext uri="{BB962C8B-B14F-4D97-AF65-F5344CB8AC3E}">
@@ -11087,6 +11663,56 @@
           </a:p>
         </p:txBody>
       </p:sp>
+      <p:sp>
+        <p:nvSpPr>
+          <p:cNvPr id="19" name="Oval 18">
+            <a:extLst>
+              <a:ext uri="{FF2B5EF4-FFF2-40B4-BE49-F238E27FC236}">
+                <a16:creationId xmlns:a16="http://schemas.microsoft.com/office/drawing/2014/main" id="{2DDBB4D6-DEE0-4B23-ABF4-3BBC49BD9ED5}"/>
+              </a:ext>
+            </a:extLst>
+          </p:cNvPr>
+          <p:cNvSpPr/>
+          <p:nvPr/>
+        </p:nvSpPr>
+        <p:spPr>
+          <a:xfrm>
+            <a:off x="6835147" y="142614"/>
+            <a:ext cx="338554" cy="338554"/>
+          </a:xfrm>
+          <a:prstGeom prst="ellipse">
+            <a:avLst/>
+          </a:prstGeom>
+          <a:solidFill>
+            <a:schemeClr val="accent6"/>
+          </a:solidFill>
+          <a:ln>
+            <a:noFill/>
+          </a:ln>
+        </p:spPr>
+        <p:style>
+          <a:lnRef idx="0">
+            <a:scrgbClr r="0" g="0" b="0"/>
+          </a:lnRef>
+          <a:fillRef idx="0">
+            <a:scrgbClr r="0" g="0" b="0"/>
+          </a:fillRef>
+          <a:effectRef idx="0">
+            <a:scrgbClr r="0" g="0" b="0"/>
+          </a:effectRef>
+          <a:fontRef idx="minor">
+            <a:schemeClr val="lt1"/>
+          </a:fontRef>
+        </p:style>
+        <p:txBody>
+          <a:bodyPr rtlCol="0" anchor="ctr"/>
+          <a:lstStyle/>
+          <a:p>
+            <a:pPr algn="ctr"/>
+            <a:endParaRPr lang="en-US"/>
+          </a:p>
+        </p:txBody>
+      </p:sp>
     </p:spTree>
     <p:extLst>
       <p:ext uri="{BB962C8B-B14F-4D97-AF65-F5344CB8AC3E}">
@@ -11931,6 +12557,56 @@
           </a:p>
         </p:txBody>
       </p:sp>
+      <p:sp>
+        <p:nvSpPr>
+          <p:cNvPr id="19" name="Oval 18">
+            <a:extLst>
+              <a:ext uri="{FF2B5EF4-FFF2-40B4-BE49-F238E27FC236}">
+                <a16:creationId xmlns:a16="http://schemas.microsoft.com/office/drawing/2014/main" id="{5EECA3B3-CC7F-4382-A4ED-637A585342DB}"/>
+              </a:ext>
+            </a:extLst>
+          </p:cNvPr>
+          <p:cNvSpPr/>
+          <p:nvPr/>
+        </p:nvSpPr>
+        <p:spPr>
+          <a:xfrm>
+            <a:off x="6835147" y="142614"/>
+            <a:ext cx="338554" cy="338554"/>
+          </a:xfrm>
+          <a:prstGeom prst="ellipse">
+            <a:avLst/>
+          </a:prstGeom>
+          <a:solidFill>
+            <a:schemeClr val="accent3"/>
+          </a:solidFill>
+          <a:ln>
+            <a:noFill/>
+          </a:ln>
+        </p:spPr>
+        <p:style>
+          <a:lnRef idx="0">
+            <a:scrgbClr r="0" g="0" b="0"/>
+          </a:lnRef>
+          <a:fillRef idx="0">
+            <a:scrgbClr r="0" g="0" b="0"/>
+          </a:fillRef>
+          <a:effectRef idx="0">
+            <a:scrgbClr r="0" g="0" b="0"/>
+          </a:effectRef>
+          <a:fontRef idx="minor">
+            <a:schemeClr val="lt1"/>
+          </a:fontRef>
+        </p:style>
+        <p:txBody>
+          <a:bodyPr rtlCol="0" anchor="ctr"/>
+          <a:lstStyle/>
+          <a:p>
+            <a:pPr algn="ctr"/>
+            <a:endParaRPr lang="en-US"/>
+          </a:p>
+        </p:txBody>
+      </p:sp>
     </p:spTree>
     <p:extLst>
       <p:ext uri="{BB962C8B-B14F-4D97-AF65-F5344CB8AC3E}">
@@ -12780,6 +13456,58 @@
           </a:p>
         </p:txBody>
       </p:sp>
+      <p:sp>
+        <p:nvSpPr>
+          <p:cNvPr id="19" name="Oval 18">
+            <a:extLst>
+              <a:ext uri="{FF2B5EF4-FFF2-40B4-BE49-F238E27FC236}">
+                <a16:creationId xmlns:a16="http://schemas.microsoft.com/office/drawing/2014/main" id="{C9FC764B-3DAD-4841-9234-60226A6D9114}"/>
+              </a:ext>
+            </a:extLst>
+          </p:cNvPr>
+          <p:cNvSpPr/>
+          <p:nvPr/>
+        </p:nvSpPr>
+        <p:spPr>
+          <a:xfrm>
+            <a:off x="6835147" y="142614"/>
+            <a:ext cx="338554" cy="338554"/>
+          </a:xfrm>
+          <a:prstGeom prst="ellipse">
+            <a:avLst/>
+          </a:prstGeom>
+          <a:solidFill>
+            <a:schemeClr val="accent6"/>
+          </a:solidFill>
+          <a:ln>
+            <a:noFill/>
+          </a:ln>
+        </p:spPr>
+        <p:style>
+          <a:lnRef idx="2">
+            <a:schemeClr val="accent1">
+              <a:shade val="50000"/>
+            </a:schemeClr>
+          </a:lnRef>
+          <a:fillRef idx="1">
+            <a:schemeClr val="accent1"/>
+          </a:fillRef>
+          <a:effectRef idx="0">
+            <a:schemeClr val="accent1"/>
+          </a:effectRef>
+          <a:fontRef idx="minor">
+            <a:schemeClr val="lt1"/>
+          </a:fontRef>
+        </p:style>
+        <p:txBody>
+          <a:bodyPr rtlCol="0" anchor="ctr"/>
+          <a:lstStyle/>
+          <a:p>
+            <a:pPr algn="ctr"/>
+            <a:endParaRPr lang="en-US"/>
+          </a:p>
+        </p:txBody>
+      </p:sp>
     </p:spTree>
     <p:extLst>
       <p:ext uri="{BB962C8B-B14F-4D97-AF65-F5344CB8AC3E}">
@@ -13612,6 +14340,56 @@
           </a:p>
         </p:txBody>
       </p:sp>
+      <p:sp>
+        <p:nvSpPr>
+          <p:cNvPr id="19" name="Oval 18">
+            <a:extLst>
+              <a:ext uri="{FF2B5EF4-FFF2-40B4-BE49-F238E27FC236}">
+                <a16:creationId xmlns:a16="http://schemas.microsoft.com/office/drawing/2014/main" id="{37C70F76-EA9E-4225-A040-AA423699A035}"/>
+              </a:ext>
+            </a:extLst>
+          </p:cNvPr>
+          <p:cNvSpPr/>
+          <p:nvPr/>
+        </p:nvSpPr>
+        <p:spPr>
+          <a:xfrm>
+            <a:off x="6835147" y="142614"/>
+            <a:ext cx="338554" cy="338554"/>
+          </a:xfrm>
+          <a:prstGeom prst="ellipse">
+            <a:avLst/>
+          </a:prstGeom>
+          <a:solidFill>
+            <a:schemeClr val="accent2"/>
+          </a:solidFill>
+          <a:ln>
+            <a:noFill/>
+          </a:ln>
+        </p:spPr>
+        <p:style>
+          <a:lnRef idx="0">
+            <a:scrgbClr r="0" g="0" b="0"/>
+          </a:lnRef>
+          <a:fillRef idx="0">
+            <a:scrgbClr r="0" g="0" b="0"/>
+          </a:fillRef>
+          <a:effectRef idx="0">
+            <a:scrgbClr r="0" g="0" b="0"/>
+          </a:effectRef>
+          <a:fontRef idx="minor">
+            <a:schemeClr val="lt1"/>
+          </a:fontRef>
+        </p:style>
+        <p:txBody>
+          <a:bodyPr rtlCol="0" anchor="ctr"/>
+          <a:lstStyle/>
+          <a:p>
+            <a:pPr algn="ctr"/>
+            <a:endParaRPr lang="en-US"/>
+          </a:p>
+        </p:txBody>
+      </p:sp>
     </p:spTree>
     <p:extLst>
       <p:ext uri="{BB962C8B-B14F-4D97-AF65-F5344CB8AC3E}">
@@ -14479,6 +15257,56 @@
           </a:p>
         </p:txBody>
       </p:sp>
+      <p:sp>
+        <p:nvSpPr>
+          <p:cNvPr id="19" name="Oval 18">
+            <a:extLst>
+              <a:ext uri="{FF2B5EF4-FFF2-40B4-BE49-F238E27FC236}">
+                <a16:creationId xmlns:a16="http://schemas.microsoft.com/office/drawing/2014/main" id="{AB274412-F61D-48FC-BFFA-DC425D3D3DEA}"/>
+              </a:ext>
+            </a:extLst>
+          </p:cNvPr>
+          <p:cNvSpPr/>
+          <p:nvPr/>
+        </p:nvSpPr>
+        <p:spPr>
+          <a:xfrm>
+            <a:off x="6835147" y="142614"/>
+            <a:ext cx="338554" cy="338554"/>
+          </a:xfrm>
+          <a:prstGeom prst="ellipse">
+            <a:avLst/>
+          </a:prstGeom>
+          <a:solidFill>
+            <a:schemeClr val="accent3"/>
+          </a:solidFill>
+          <a:ln>
+            <a:noFill/>
+          </a:ln>
+        </p:spPr>
+        <p:style>
+          <a:lnRef idx="0">
+            <a:scrgbClr r="0" g="0" b="0"/>
+          </a:lnRef>
+          <a:fillRef idx="0">
+            <a:scrgbClr r="0" g="0" b="0"/>
+          </a:fillRef>
+          <a:effectRef idx="0">
+            <a:scrgbClr r="0" g="0" b="0"/>
+          </a:effectRef>
+          <a:fontRef idx="minor">
+            <a:schemeClr val="lt1"/>
+          </a:fontRef>
+        </p:style>
+        <p:txBody>
+          <a:bodyPr rtlCol="0" anchor="ctr"/>
+          <a:lstStyle/>
+          <a:p>
+            <a:pPr algn="ctr"/>
+            <a:endParaRPr lang="en-US"/>
+          </a:p>
+        </p:txBody>
+      </p:sp>
     </p:spTree>
     <p:extLst>
       <p:ext uri="{BB962C8B-B14F-4D97-AF65-F5344CB8AC3E}">
@@ -15331,6 +16159,56 @@
           </a:p>
         </p:txBody>
       </p:sp>
+      <p:sp>
+        <p:nvSpPr>
+          <p:cNvPr id="19" name="Oval 18">
+            <a:extLst>
+              <a:ext uri="{FF2B5EF4-FFF2-40B4-BE49-F238E27FC236}">
+                <a16:creationId xmlns:a16="http://schemas.microsoft.com/office/drawing/2014/main" id="{CC70DFA0-B3AF-4F94-9E5F-4E660A0263E9}"/>
+              </a:ext>
+            </a:extLst>
+          </p:cNvPr>
+          <p:cNvSpPr/>
+          <p:nvPr/>
+        </p:nvSpPr>
+        <p:spPr>
+          <a:xfrm>
+            <a:off x="6835147" y="142614"/>
+            <a:ext cx="338554" cy="338554"/>
+          </a:xfrm>
+          <a:prstGeom prst="ellipse">
+            <a:avLst/>
+          </a:prstGeom>
+          <a:solidFill>
+            <a:schemeClr val="accent3"/>
+          </a:solidFill>
+          <a:ln>
+            <a:noFill/>
+          </a:ln>
+        </p:spPr>
+        <p:style>
+          <a:lnRef idx="0">
+            <a:scrgbClr r="0" g="0" b="0"/>
+          </a:lnRef>
+          <a:fillRef idx="0">
+            <a:scrgbClr r="0" g="0" b="0"/>
+          </a:fillRef>
+          <a:effectRef idx="0">
+            <a:scrgbClr r="0" g="0" b="0"/>
+          </a:effectRef>
+          <a:fontRef idx="minor">
+            <a:schemeClr val="lt1"/>
+          </a:fontRef>
+        </p:style>
+        <p:txBody>
+          <a:bodyPr rtlCol="0" anchor="ctr"/>
+          <a:lstStyle/>
+          <a:p>
+            <a:pPr algn="ctr"/>
+            <a:endParaRPr lang="en-US"/>
+          </a:p>
+        </p:txBody>
+      </p:sp>
     </p:spTree>
     <p:extLst>
       <p:ext uri="{BB962C8B-B14F-4D97-AF65-F5344CB8AC3E}">
@@ -15745,7 +16623,7 @@
         </p:nvSpPr>
         <p:spPr>
           <a:xfrm>
-            <a:off x="1171182" y="1789393"/>
+            <a:off x="1225178" y="1779702"/>
             <a:ext cx="5833242" cy="338554"/>
           </a:xfrm>
           <a:prstGeom prst="rect">
@@ -16189,6 +17067,58 @@
               </a:rPr>
               <a:t>n/a</a:t>
             </a:r>
+          </a:p>
+        </p:txBody>
+      </p:sp>
+      <p:sp>
+        <p:nvSpPr>
+          <p:cNvPr id="19" name="Oval 18">
+            <a:extLst>
+              <a:ext uri="{FF2B5EF4-FFF2-40B4-BE49-F238E27FC236}">
+                <a16:creationId xmlns:a16="http://schemas.microsoft.com/office/drawing/2014/main" id="{0C9DA72E-B6B5-480D-A7C4-7689115F3146}"/>
+              </a:ext>
+            </a:extLst>
+          </p:cNvPr>
+          <p:cNvSpPr/>
+          <p:nvPr/>
+        </p:nvSpPr>
+        <p:spPr>
+          <a:xfrm>
+            <a:off x="6835147" y="142614"/>
+            <a:ext cx="338554" cy="338554"/>
+          </a:xfrm>
+          <a:prstGeom prst="ellipse">
+            <a:avLst/>
+          </a:prstGeom>
+          <a:solidFill>
+            <a:schemeClr val="accent6"/>
+          </a:solidFill>
+          <a:ln>
+            <a:noFill/>
+          </a:ln>
+        </p:spPr>
+        <p:style>
+          <a:lnRef idx="2">
+            <a:schemeClr val="accent1">
+              <a:shade val="50000"/>
+            </a:schemeClr>
+          </a:lnRef>
+          <a:fillRef idx="1">
+            <a:schemeClr val="accent1"/>
+          </a:fillRef>
+          <a:effectRef idx="0">
+            <a:schemeClr val="accent1"/>
+          </a:effectRef>
+          <a:fontRef idx="minor">
+            <a:schemeClr val="lt1"/>
+          </a:fontRef>
+        </p:style>
+        <p:txBody>
+          <a:bodyPr rtlCol="0" anchor="ctr"/>
+          <a:lstStyle/>
+          <a:p>
+            <a:pPr algn="ctr"/>
+            <a:endParaRPr lang="en-US"/>
           </a:p>
         </p:txBody>
       </p:sp>
@@ -17018,6 +17948,58 @@
           </a:p>
         </p:txBody>
       </p:sp>
+      <p:sp>
+        <p:nvSpPr>
+          <p:cNvPr id="19" name="Oval 18">
+            <a:extLst>
+              <a:ext uri="{FF2B5EF4-FFF2-40B4-BE49-F238E27FC236}">
+                <a16:creationId xmlns:a16="http://schemas.microsoft.com/office/drawing/2014/main" id="{B8DF9557-EFEB-442E-A3FC-393BD9C57325}"/>
+              </a:ext>
+            </a:extLst>
+          </p:cNvPr>
+          <p:cNvSpPr/>
+          <p:nvPr/>
+        </p:nvSpPr>
+        <p:spPr>
+          <a:xfrm>
+            <a:off x="6835147" y="142614"/>
+            <a:ext cx="338554" cy="338554"/>
+          </a:xfrm>
+          <a:prstGeom prst="ellipse">
+            <a:avLst/>
+          </a:prstGeom>
+          <a:solidFill>
+            <a:schemeClr val="accent6"/>
+          </a:solidFill>
+          <a:ln>
+            <a:noFill/>
+          </a:ln>
+        </p:spPr>
+        <p:style>
+          <a:lnRef idx="2">
+            <a:schemeClr val="accent1">
+              <a:shade val="50000"/>
+            </a:schemeClr>
+          </a:lnRef>
+          <a:fillRef idx="1">
+            <a:schemeClr val="accent1"/>
+          </a:fillRef>
+          <a:effectRef idx="0">
+            <a:schemeClr val="accent1"/>
+          </a:effectRef>
+          <a:fontRef idx="minor">
+            <a:schemeClr val="lt1"/>
+          </a:fontRef>
+        </p:style>
+        <p:txBody>
+          <a:bodyPr rtlCol="0" anchor="ctr"/>
+          <a:lstStyle/>
+          <a:p>
+            <a:pPr algn="ctr"/>
+            <a:endParaRPr lang="en-US"/>
+          </a:p>
+        </p:txBody>
+      </p:sp>
     </p:spTree>
     <p:extLst>
       <p:ext uri="{BB962C8B-B14F-4D97-AF65-F5344CB8AC3E}">
@@ -17850,6 +18832,58 @@
           </a:p>
         </p:txBody>
       </p:sp>
+      <p:sp>
+        <p:nvSpPr>
+          <p:cNvPr id="19" name="Oval 18">
+            <a:extLst>
+              <a:ext uri="{FF2B5EF4-FFF2-40B4-BE49-F238E27FC236}">
+                <a16:creationId xmlns:a16="http://schemas.microsoft.com/office/drawing/2014/main" id="{7CA1C301-D7C7-4F17-A20B-5DA5A80FEBCE}"/>
+              </a:ext>
+            </a:extLst>
+          </p:cNvPr>
+          <p:cNvSpPr/>
+          <p:nvPr/>
+        </p:nvSpPr>
+        <p:spPr>
+          <a:xfrm>
+            <a:off x="6835147" y="142614"/>
+            <a:ext cx="338554" cy="338554"/>
+          </a:xfrm>
+          <a:prstGeom prst="ellipse">
+            <a:avLst/>
+          </a:prstGeom>
+          <a:solidFill>
+            <a:schemeClr val="accent6"/>
+          </a:solidFill>
+          <a:ln>
+            <a:noFill/>
+          </a:ln>
+        </p:spPr>
+        <p:style>
+          <a:lnRef idx="2">
+            <a:schemeClr val="accent1">
+              <a:shade val="50000"/>
+            </a:schemeClr>
+          </a:lnRef>
+          <a:fillRef idx="1">
+            <a:schemeClr val="accent1"/>
+          </a:fillRef>
+          <a:effectRef idx="0">
+            <a:schemeClr val="accent1"/>
+          </a:effectRef>
+          <a:fontRef idx="minor">
+            <a:schemeClr val="lt1"/>
+          </a:fontRef>
+        </p:style>
+        <p:txBody>
+          <a:bodyPr rtlCol="0" anchor="ctr"/>
+          <a:lstStyle/>
+          <a:p>
+            <a:pPr algn="ctr"/>
+            <a:endParaRPr lang="en-US"/>
+          </a:p>
+        </p:txBody>
+      </p:sp>
     </p:spTree>
     <p:extLst>
       <p:ext uri="{BB962C8B-B14F-4D97-AF65-F5344CB8AC3E}">
@@ -18711,6 +19745,56 @@
           </a:p>
         </p:txBody>
       </p:sp>
+      <p:sp>
+        <p:nvSpPr>
+          <p:cNvPr id="19" name="Oval 18">
+            <a:extLst>
+              <a:ext uri="{FF2B5EF4-FFF2-40B4-BE49-F238E27FC236}">
+                <a16:creationId xmlns:a16="http://schemas.microsoft.com/office/drawing/2014/main" id="{2682DB23-C7DD-4F0C-BA54-6B6E1479218F}"/>
+              </a:ext>
+            </a:extLst>
+          </p:cNvPr>
+          <p:cNvSpPr/>
+          <p:nvPr/>
+        </p:nvSpPr>
+        <p:spPr>
+          <a:xfrm>
+            <a:off x="6835147" y="118708"/>
+            <a:ext cx="338554" cy="338554"/>
+          </a:xfrm>
+          <a:prstGeom prst="ellipse">
+            <a:avLst/>
+          </a:prstGeom>
+          <a:solidFill>
+            <a:schemeClr val="accent6"/>
+          </a:solidFill>
+          <a:ln>
+            <a:noFill/>
+          </a:ln>
+        </p:spPr>
+        <p:style>
+          <a:lnRef idx="0">
+            <a:scrgbClr r="0" g="0" b="0"/>
+          </a:lnRef>
+          <a:fillRef idx="0">
+            <a:scrgbClr r="0" g="0" b="0"/>
+          </a:fillRef>
+          <a:effectRef idx="0">
+            <a:scrgbClr r="0" g="0" b="0"/>
+          </a:effectRef>
+          <a:fontRef idx="minor">
+            <a:schemeClr val="lt1"/>
+          </a:fontRef>
+        </p:style>
+        <p:txBody>
+          <a:bodyPr rtlCol="0" anchor="ctr"/>
+          <a:lstStyle/>
+          <a:p>
+            <a:pPr algn="ctr"/>
+            <a:endParaRPr lang="en-US"/>
+          </a:p>
+        </p:txBody>
+      </p:sp>
     </p:spTree>
     <p:extLst>
       <p:ext uri="{BB962C8B-B14F-4D97-AF65-F5344CB8AC3E}">
@@ -19552,6 +20636,56 @@
           </a:p>
         </p:txBody>
       </p:sp>
+      <p:sp>
+        <p:nvSpPr>
+          <p:cNvPr id="19" name="Oval 18">
+            <a:extLst>
+              <a:ext uri="{FF2B5EF4-FFF2-40B4-BE49-F238E27FC236}">
+                <a16:creationId xmlns:a16="http://schemas.microsoft.com/office/drawing/2014/main" id="{6AF3BE83-3FD5-4F72-BB3E-684FD685FAAC}"/>
+              </a:ext>
+            </a:extLst>
+          </p:cNvPr>
+          <p:cNvSpPr/>
+          <p:nvPr/>
+        </p:nvSpPr>
+        <p:spPr>
+          <a:xfrm>
+            <a:off x="6835147" y="142614"/>
+            <a:ext cx="338554" cy="338554"/>
+          </a:xfrm>
+          <a:prstGeom prst="ellipse">
+            <a:avLst/>
+          </a:prstGeom>
+          <a:solidFill>
+            <a:schemeClr val="accent3"/>
+          </a:solidFill>
+          <a:ln>
+            <a:noFill/>
+          </a:ln>
+        </p:spPr>
+        <p:style>
+          <a:lnRef idx="0">
+            <a:scrgbClr r="0" g="0" b="0"/>
+          </a:lnRef>
+          <a:fillRef idx="0">
+            <a:scrgbClr r="0" g="0" b="0"/>
+          </a:fillRef>
+          <a:effectRef idx="0">
+            <a:scrgbClr r="0" g="0" b="0"/>
+          </a:effectRef>
+          <a:fontRef idx="minor">
+            <a:schemeClr val="lt1"/>
+          </a:fontRef>
+        </p:style>
+        <p:txBody>
+          <a:bodyPr rtlCol="0" anchor="ctr"/>
+          <a:lstStyle/>
+          <a:p>
+            <a:pPr algn="ctr"/>
+            <a:endParaRPr lang="en-US"/>
+          </a:p>
+        </p:txBody>
+      </p:sp>
     </p:spTree>
     <p:extLst>
       <p:ext uri="{BB962C8B-B14F-4D97-AF65-F5344CB8AC3E}">
@@ -20413,6 +21547,56 @@
           </a:p>
         </p:txBody>
       </p:sp>
+      <p:sp>
+        <p:nvSpPr>
+          <p:cNvPr id="21" name="Oval 20">
+            <a:extLst>
+              <a:ext uri="{FF2B5EF4-FFF2-40B4-BE49-F238E27FC236}">
+                <a16:creationId xmlns:a16="http://schemas.microsoft.com/office/drawing/2014/main" id="{6A3A3884-5B09-4715-8B67-3CB20B7DA626}"/>
+              </a:ext>
+            </a:extLst>
+          </p:cNvPr>
+          <p:cNvSpPr/>
+          <p:nvPr/>
+        </p:nvSpPr>
+        <p:spPr>
+          <a:xfrm>
+            <a:off x="6835147" y="142614"/>
+            <a:ext cx="338554" cy="338554"/>
+          </a:xfrm>
+          <a:prstGeom prst="ellipse">
+            <a:avLst/>
+          </a:prstGeom>
+          <a:solidFill>
+            <a:schemeClr val="accent3"/>
+          </a:solidFill>
+          <a:ln>
+            <a:noFill/>
+          </a:ln>
+        </p:spPr>
+        <p:style>
+          <a:lnRef idx="0">
+            <a:scrgbClr r="0" g="0" b="0"/>
+          </a:lnRef>
+          <a:fillRef idx="0">
+            <a:scrgbClr r="0" g="0" b="0"/>
+          </a:fillRef>
+          <a:effectRef idx="0">
+            <a:scrgbClr r="0" g="0" b="0"/>
+          </a:effectRef>
+          <a:fontRef idx="minor">
+            <a:schemeClr val="lt1"/>
+          </a:fontRef>
+        </p:style>
+        <p:txBody>
+          <a:bodyPr rtlCol="0" anchor="ctr"/>
+          <a:lstStyle/>
+          <a:p>
+            <a:pPr algn="ctr"/>
+            <a:endParaRPr lang="en-US"/>
+          </a:p>
+        </p:txBody>
+      </p:sp>
     </p:spTree>
     <p:extLst>
       <p:ext uri="{BB962C8B-B14F-4D97-AF65-F5344CB8AC3E}">
@@ -21271,6 +22455,56 @@
               </a:rPr>
               <a:t>n/a</a:t>
             </a:r>
+          </a:p>
+        </p:txBody>
+      </p:sp>
+      <p:sp>
+        <p:nvSpPr>
+          <p:cNvPr id="19" name="Oval 18">
+            <a:extLst>
+              <a:ext uri="{FF2B5EF4-FFF2-40B4-BE49-F238E27FC236}">
+                <a16:creationId xmlns:a16="http://schemas.microsoft.com/office/drawing/2014/main" id="{82886224-951E-497B-A322-645667C8F56C}"/>
+              </a:ext>
+            </a:extLst>
+          </p:cNvPr>
+          <p:cNvSpPr/>
+          <p:nvPr/>
+        </p:nvSpPr>
+        <p:spPr>
+          <a:xfrm>
+            <a:off x="6835147" y="142614"/>
+            <a:ext cx="338554" cy="338554"/>
+          </a:xfrm>
+          <a:prstGeom prst="ellipse">
+            <a:avLst/>
+          </a:prstGeom>
+          <a:solidFill>
+            <a:schemeClr val="accent3"/>
+          </a:solidFill>
+          <a:ln>
+            <a:noFill/>
+          </a:ln>
+        </p:spPr>
+        <p:style>
+          <a:lnRef idx="0">
+            <a:scrgbClr r="0" g="0" b="0"/>
+          </a:lnRef>
+          <a:fillRef idx="0">
+            <a:scrgbClr r="0" g="0" b="0"/>
+          </a:fillRef>
+          <a:effectRef idx="0">
+            <a:scrgbClr r="0" g="0" b="0"/>
+          </a:effectRef>
+          <a:fontRef idx="minor">
+            <a:schemeClr val="lt1"/>
+          </a:fontRef>
+        </p:style>
+        <p:txBody>
+          <a:bodyPr rtlCol="0" anchor="ctr"/>
+          <a:lstStyle/>
+          <a:p>
+            <a:pPr algn="ctr"/>
+            <a:endParaRPr lang="en-US"/>
           </a:p>
         </p:txBody>
       </p:sp>

</xml_diff>

<commit_message>
Update Requirements.ppt with survey data
</commit_message>
<xml_diff>
--- a/docs/Requirements.pptx
+++ b/docs/Requirements.pptx
@@ -4,6 +4,9 @@
   <p:sldMasterIdLst>
     <p:sldMasterId id="2147483660" r:id="rId1"/>
   </p:sldMasterIdLst>
+  <p:notesMasterIdLst>
+    <p:notesMasterId r:id="rId24"/>
+  </p:notesMasterIdLst>
   <p:sldIdLst>
     <p:sldId id="256" r:id="rId2"/>
     <p:sldId id="257" r:id="rId3"/>
@@ -135,7 +138,7 @@
 
 <file path=ppt/commentAuthors.xml><?xml version="1.0" encoding="utf-8"?>
 <p:cmAuthorLst xmlns:a="http://schemas.openxmlformats.org/drawingml/2006/main" xmlns:r="http://schemas.openxmlformats.org/officeDocument/2006/relationships" xmlns:p="http://schemas.openxmlformats.org/presentationml/2006/main">
-  <p:cmAuthor id="1" name="Jonathan Flum" initials="JF" lastIdx="12" clrIdx="0">
+  <p:cmAuthor id="1" name="Jonathan Flum" initials="JF" lastIdx="35" clrIdx="0">
     <p:extLst>
       <p:ext uri="{19B8F6BF-5375-455C-9EA6-DF929625EA0E}">
         <p15:presenceInfo xmlns:p15="http://schemas.microsoft.com/office/powerpoint/2012/main" userId="3e98484f77a34245" providerId="Windows Live"/>
@@ -146,6 +149,258 @@
 </file>
 
 <file path=ppt/comments/comment1.xml><?xml version="1.0" encoding="utf-8"?>
+<p:cmLst xmlns:a="http://schemas.openxmlformats.org/drawingml/2006/main" xmlns:r="http://schemas.openxmlformats.org/officeDocument/2006/relationships" xmlns:p="http://schemas.openxmlformats.org/presentationml/2006/main">
+  <p:cm authorId="1" dt="2023-09-19T10:14:21.917" idx="14">
+    <p:pos x="4366" y="1328"/>
+    <p:text>Represented in difficulties "experienced," "advanced," and "expert." To ease the learning curve, lower difficulties ("novice" and "intermediate" feature fewer tiles and less data complication.</p:text>
+    <p:extLst>
+      <p:ext uri="{C676402C-5697-4E1C-873F-D02D1690AC5C}">
+        <p15:threadingInfo xmlns:p15="http://schemas.microsoft.com/office/powerpoint/2012/main" timeZoneBias="240"/>
+      </p:ext>
+    </p:extLst>
+  </p:cm>
+</p:cmLst>
+</file>
+
+<file path=ppt/comments/comment10.xml><?xml version="1.0" encoding="utf-8"?>
+<p:cmLst xmlns:a="http://schemas.openxmlformats.org/drawingml/2006/main" xmlns:r="http://schemas.openxmlformats.org/officeDocument/2006/relationships" xmlns:p="http://schemas.openxmlformats.org/presentationml/2006/main">
+  <p:cm authorId="1" dt="2023-04-06T12:43:21.098" idx="11">
+    <p:pos x="4288" y="395"/>
+    <p:text>Five selectable difficulty levels and three game modes are currently available.</p:text>
+    <p:extLst>
+      <p:ext uri="{C676402C-5697-4E1C-873F-D02D1690AC5C}">
+        <p15:threadingInfo xmlns:p15="http://schemas.microsoft.com/office/powerpoint/2012/main" timeZoneBias="240"/>
+      </p:ext>
+    </p:extLst>
+  </p:cm>
+  <p:cm authorId="1" dt="2023-09-19T10:40:38.503" idx="22">
+    <p:pos x="4329" y="1328"/>
+    <p:text>Survey statement: "I successfully achieved an accuracy rating greater than 50% on my initial game session, or during a subsequent session by adjusting the difficulty or selecting a different game mode."
+100% - true
+0% - false</p:text>
+    <p:extLst>
+      <p:ext uri="{C676402C-5697-4E1C-873F-D02D1690AC5C}">
+        <p15:threadingInfo xmlns:p15="http://schemas.microsoft.com/office/powerpoint/2012/main" timeZoneBias="240"/>
+      </p:ext>
+    </p:extLst>
+  </p:cm>
+</p:cmLst>
+</file>
+
+<file path=ppt/comments/comment11.xml><?xml version="1.0" encoding="utf-8"?>
+<p:cmLst xmlns:a="http://schemas.openxmlformats.org/drawingml/2006/main" xmlns:r="http://schemas.openxmlformats.org/officeDocument/2006/relationships" xmlns:p="http://schemas.openxmlformats.org/presentationml/2006/main">
+  <p:cm authorId="1" dt="2023-04-06T11:48:07.510" idx="7">
+    <p:pos x="3832" y="1332"/>
+    <p:text>Tutorial documentation (instruction manual) provided, with the addition of free play mode to gain confidence. Interactive tutorial to be implemented in a future version.
+Fit Criterion modification: Provided a random, representative sample of the target population, all users (100%) after having read tutorial documentation, will see a game session to completion with at least one correct answer.
+Substantiated via requirement # 3.01 survey results.</p:text>
+    <p:extLst>
+      <p:ext uri="{C676402C-5697-4E1C-873F-D02D1690AC5C}">
+        <p15:threadingInfo xmlns:p15="http://schemas.microsoft.com/office/powerpoint/2012/main" timeZoneBias="240"/>
+      </p:ext>
+    </p:extLst>
+  </p:cm>
+</p:cmLst>
+</file>
+
+<file path=ppt/comments/comment12.xml><?xml version="1.0" encoding="utf-8"?>
+<p:cmLst xmlns:a="http://schemas.openxmlformats.org/drawingml/2006/main" xmlns:r="http://schemas.openxmlformats.org/officeDocument/2006/relationships" xmlns:p="http://schemas.openxmlformats.org/presentationml/2006/main">
+  <p:cm authorId="1" dt="2023-09-19T10:58:02.542" idx="26">
+    <p:pos x="4362" y="1328"/>
+    <p:text>Survey statement: "I possessed a clear understanding of the user interface (i.e., buttons, menus, controls, icons, terminology, and other attributes were intuitive and predictable)."
+84.62% - agree or strongly agree
+15.38% - neither agree or disagree
+0% - disagree or strongly disagree</p:text>
+    <p:extLst>
+      <p:ext uri="{C676402C-5697-4E1C-873F-D02D1690AC5C}">
+        <p15:threadingInfo xmlns:p15="http://schemas.microsoft.com/office/powerpoint/2012/main" timeZoneBias="240"/>
+      </p:ext>
+    </p:extLst>
+  </p:cm>
+</p:cmLst>
+</file>
+
+<file path=ppt/comments/comment13.xml><?xml version="1.0" encoding="utf-8"?>
+<p:cmLst xmlns:a="http://schemas.openxmlformats.org/drawingml/2006/main" xmlns:r="http://schemas.openxmlformats.org/officeDocument/2006/relationships" xmlns:p="http://schemas.openxmlformats.org/presentationml/2006/main">
+  <p:cm authorId="1" dt="2023-04-06T11:49:31.829" idx="8">
+    <p:pos x="4254" y="395"/>
+    <p:text>Programmatically possible, however fundamentally not suitable for the intended gameplay/learning outcome.
+Explored options: excluding color attributes from procedurally generated queries (resulted in a crippled question pool that sidelined data complexity) and utilizing color-shift post processing filters (resulted in frustrating distinctions between similar hues).</p:text>
+    <p:extLst>
+      <p:ext uri="{C676402C-5697-4E1C-873F-D02D1690AC5C}">
+        <p15:threadingInfo xmlns:p15="http://schemas.microsoft.com/office/powerpoint/2012/main" timeZoneBias="240"/>
+      </p:ext>
+    </p:extLst>
+  </p:cm>
+  <p:cm authorId="1" dt="2023-09-19T11:09:19.163" idx="28">
+    <p:pos x="4366" y="1328"/>
+    <p:text>To the best of my knowledge, zero respondents possessed a visual impairment.</p:text>
+    <p:extLst>
+      <p:ext uri="{C676402C-5697-4E1C-873F-D02D1690AC5C}">
+        <p15:threadingInfo xmlns:p15="http://schemas.microsoft.com/office/powerpoint/2012/main" timeZoneBias="240"/>
+      </p:ext>
+    </p:extLst>
+  </p:cm>
+</p:cmLst>
+</file>
+
+<file path=ppt/comments/comment14.xml><?xml version="1.0" encoding="utf-8"?>
+<p:cmLst xmlns:a="http://schemas.openxmlformats.org/drawingml/2006/main" xmlns:r="http://schemas.openxmlformats.org/officeDocument/2006/relationships" xmlns:p="http://schemas.openxmlformats.org/presentationml/2006/main">
+  <p:cm authorId="1" dt="2023-04-06T11:50:44.291" idx="9">
+    <p:pos x="4224" y="395"/>
+    <p:text>Implemented text auto-sizing. The largest font point (to a degree) will always be utilized given the amount of text and available field space. Can manually scale elements smaller, though there exists no reason do to given the current permutation bounds.</p:text>
+    <p:extLst>
+      <p:ext uri="{C676402C-5697-4E1C-873F-D02D1690AC5C}">
+        <p15:threadingInfo xmlns:p15="http://schemas.microsoft.com/office/powerpoint/2012/main" timeZoneBias="240"/>
+      </p:ext>
+    </p:extLst>
+  </p:cm>
+  <p:cm authorId="1" dt="2023-09-19T11:08:00.501" idx="27">
+    <p:pos x="4366" y="1328"/>
+    <p:text>Substantiated via requirement #s 3.01 and 3.02 survey results.</p:text>
+    <p:extLst>
+      <p:ext uri="{C676402C-5697-4E1C-873F-D02D1690AC5C}">
+        <p15:threadingInfo xmlns:p15="http://schemas.microsoft.com/office/powerpoint/2012/main" timeZoneBias="240"/>
+      </p:ext>
+    </p:extLst>
+  </p:cm>
+</p:cmLst>
+</file>
+
+<file path=ppt/comments/comment15.xml><?xml version="1.0" encoding="utf-8"?>
+<p:cmLst xmlns:a="http://schemas.openxmlformats.org/drawingml/2006/main" xmlns:r="http://schemas.openxmlformats.org/officeDocument/2006/relationships" xmlns:p="http://schemas.openxmlformats.org/presentationml/2006/main">
+  <p:cm authorId="1" dt="2023-09-19T11:10:47.395" idx="29">
+    <p:pos x="4307" y="1328"/>
+    <p:text>Feedback not solicited directly due to free-tier survey hosting limitations (capping the total of number questions the survey could contain), however, "Please rate your overall experience and satisfaction with the application" was asked.
+100% - satisfied or very satisfied
+0% - neither satisfied nor dissatisfied
+0% - dissatisfied or very dissatisfied
+Additionally, no burden is placed on the user in terms of user profile saving/loading, configuration, etc. These processes are all automatic. However, the user may reset their profile at any time via the Title Screen.</p:text>
+    <p:extLst>
+      <p:ext uri="{C676402C-5697-4E1C-873F-D02D1690AC5C}">
+        <p15:threadingInfo xmlns:p15="http://schemas.microsoft.com/office/powerpoint/2012/main" timeZoneBias="240"/>
+      </p:ext>
+    </p:extLst>
+  </p:cm>
+</p:cmLst>
+</file>
+
+<file path=ppt/comments/comment16.xml><?xml version="1.0" encoding="utf-8"?>
+<p:cmLst xmlns:a="http://schemas.openxmlformats.org/drawingml/2006/main" xmlns:r="http://schemas.openxmlformats.org/officeDocument/2006/relationships" xmlns:p="http://schemas.openxmlformats.org/presentationml/2006/main">
+  <p:cm authorId="1" dt="2023-09-19T11:21:41.581" idx="30">
+    <p:pos x="4326" y="1328"/>
+    <p:text>Survey statement: "The application loaded in a timely manner, reaching the Title Screen within 30 seconds."
+76.92% - true
+23.08% - false
+Note: results here are curious and warrant further investigation. From additional feedback some respondents offered, there seems to be a correlation between slow load times and those residing on campus. Additional testing would require information regarding the user's specific access point as well as their hardware and software configurations.</p:text>
+    <p:extLst>
+      <p:ext uri="{C676402C-5697-4E1C-873F-D02D1690AC5C}">
+        <p15:threadingInfo xmlns:p15="http://schemas.microsoft.com/office/powerpoint/2012/main" timeZoneBias="240"/>
+      </p:ext>
+    </p:extLst>
+  </p:cm>
+</p:cmLst>
+</file>
+
+<file path=ppt/comments/comment17.xml><?xml version="1.0" encoding="utf-8"?>
+<p:cmLst xmlns:a="http://schemas.openxmlformats.org/drawingml/2006/main" xmlns:r="http://schemas.openxmlformats.org/officeDocument/2006/relationships" xmlns:p="http://schemas.openxmlformats.org/presentationml/2006/main">
+  <p:cm authorId="1" dt="2023-09-19T11:26:33.258" idx="31">
+    <p:pos x="4366" y="1328"/>
+    <p:text>Actual gameplay enagement time is tracked (i.e. not including menus, etc.). Current implementation reminds user to take a break every 30 minutes, though does not prevent dismissal and continuance. Returning to the Title Screen for a period of time or quitting the application resets this counter. This feature is enabled by default, but can be turned off via the settings menu.</p:text>
+    <p:extLst>
+      <p:ext uri="{C676402C-5697-4E1C-873F-D02D1690AC5C}">
+        <p15:threadingInfo xmlns:p15="http://schemas.microsoft.com/office/powerpoint/2012/main" timeZoneBias="240"/>
+      </p:ext>
+    </p:extLst>
+  </p:cm>
+</p:cmLst>
+</file>
+
+<file path=ppt/comments/comment18.xml><?xml version="1.0" encoding="utf-8"?>
+<p:cmLst xmlns:a="http://schemas.openxmlformats.org/drawingml/2006/main" xmlns:r="http://schemas.openxmlformats.org/officeDocument/2006/relationships" xmlns:p="http://schemas.openxmlformats.org/presentationml/2006/main">
+  <p:cm authorId="1" dt="2023-09-19T11:29:05.453" idx="32">
+    <p:pos x="4281" y="1328"/>
+    <p:text>There is no indication that suggests this would not always be the case, however some users noted in their feedback that they believed numerical responses should also be accepted (as opposed to the number typed in word format). This was a gameplay design decision with regard to how a user processes/translates data information, just as they would with colors or shapes.</p:text>
+    <p:extLst>
+      <p:ext uri="{C676402C-5697-4E1C-873F-D02D1690AC5C}">
+        <p15:threadingInfo xmlns:p15="http://schemas.microsoft.com/office/powerpoint/2012/main" timeZoneBias="240"/>
+      </p:ext>
+    </p:extLst>
+  </p:cm>
+</p:cmLst>
+</file>
+
+<file path=ppt/comments/comment19.xml><?xml version="1.0" encoding="utf-8"?>
+<p:cmLst xmlns:a="http://schemas.openxmlformats.org/drawingml/2006/main" xmlns:r="http://schemas.openxmlformats.org/officeDocument/2006/relationships" xmlns:p="http://schemas.openxmlformats.org/presentationml/2006/main">
+  <p:cm authorId="1" dt="2023-09-19T11:33:48.965" idx="33">
+    <p:pos x="4190" y="1328"/>
+    <p:text>Feedback not solicited directly due to free-tier survey hosting limitations (capping the total of number questions the survey could contain), however, can be inferred and substantiated via requirement # 4.01 survey results in that all users were able to successfully access the program.</p:text>
+    <p:extLst>
+      <p:ext uri="{C676402C-5697-4E1C-873F-D02D1690AC5C}">
+        <p15:threadingInfo xmlns:p15="http://schemas.microsoft.com/office/powerpoint/2012/main" timeZoneBias="240"/>
+      </p:ext>
+    </p:extLst>
+  </p:cm>
+</p:cmLst>
+</file>
+
+<file path=ppt/comments/comment2.xml><?xml version="1.0" encoding="utf-8"?>
+<p:cmLst xmlns:a="http://schemas.openxmlformats.org/drawingml/2006/main" xmlns:r="http://schemas.openxmlformats.org/officeDocument/2006/relationships" xmlns:p="http://schemas.openxmlformats.org/presentationml/2006/main">
+  <p:cm authorId="1" dt="2023-09-19T10:18:03.780" idx="15">
+    <p:pos x="4326" y="1328"/>
+    <p:text>Satisfied in all difficulties. Higher levels ("advanced," "expert," and beyond) present multiple queries.</p:text>
+    <p:extLst>
+      <p:ext uri="{C676402C-5697-4E1C-873F-D02D1690AC5C}">
+        <p15:threadingInfo xmlns:p15="http://schemas.microsoft.com/office/powerpoint/2012/main" timeZoneBias="240"/>
+      </p:ext>
+    </p:extLst>
+  </p:cm>
+</p:cmLst>
+</file>
+
+<file path=ppt/comments/comment20.xml><?xml version="1.0" encoding="utf-8"?>
+<p:cmLst xmlns:a="http://schemas.openxmlformats.org/drawingml/2006/main" xmlns:r="http://schemas.openxmlformats.org/officeDocument/2006/relationships" xmlns:p="http://schemas.openxmlformats.org/presentationml/2006/main">
+  <p:cm authorId="1" dt="2023-04-06T11:54:56.223" idx="10">
+    <p:pos x="4344" y="395"/>
+    <p:text>WebGL browser caching utilized for individual player data, stored locally on the user's machine. A future revision could warrant exportation, aggregation, and therefore a redundancy, should leaderboards, PvP, etc. be indicated.</p:text>
+    <p:extLst>
+      <p:ext uri="{C676402C-5697-4E1C-873F-D02D1690AC5C}">
+        <p15:threadingInfo xmlns:p15="http://schemas.microsoft.com/office/powerpoint/2012/main" timeZoneBias="240"/>
+      </p:ext>
+    </p:extLst>
+  </p:cm>
+</p:cmLst>
+</file>
+
+<file path=ppt/comments/comment21.xml><?xml version="1.0" encoding="utf-8"?>
+<p:cmLst xmlns:a="http://schemas.openxmlformats.org/drawingml/2006/main" xmlns:r="http://schemas.openxmlformats.org/officeDocument/2006/relationships" xmlns:p="http://schemas.openxmlformats.org/presentationml/2006/main">
+  <p:cm authorId="1" dt="2023-09-19T11:39:58.527" idx="34">
+    <p:pos x="4300" y="1328"/>
+    <p:text>Published files are within compliance. Unity's "Library" directory is omitted from the repository as it is quite large and can be generated on the fly within the IDE if one is not present in the project folder.</p:text>
+    <p:extLst>
+      <p:ext uri="{C676402C-5697-4E1C-873F-D02D1690AC5C}">
+        <p15:threadingInfo xmlns:p15="http://schemas.microsoft.com/office/powerpoint/2012/main" timeZoneBias="240"/>
+      </p:ext>
+    </p:extLst>
+  </p:cm>
+</p:cmLst>
+</file>
+
+<file path=ppt/comments/comment22.xml><?xml version="1.0" encoding="utf-8"?>
+<p:cmLst xmlns:a="http://schemas.openxmlformats.org/drawingml/2006/main" xmlns:r="http://schemas.openxmlformats.org/officeDocument/2006/relationships" xmlns:p="http://schemas.openxmlformats.org/presentationml/2006/main">
+  <p:cm authorId="1" dt="2023-09-19T11:43:01.953" idx="35">
+    <p:pos x="4153" y="1328"/>
+    <p:text>Over the survey period, there was an average of less than 1 respondent (and therefore concurrent application access) per day. I would approximate a near 0% allocation usage at any given time for this test period. Throughput scaling is therefore not indicated at this time.</p:text>
+    <p:extLst>
+      <p:ext uri="{C676402C-5697-4E1C-873F-D02D1690AC5C}">
+        <p15:threadingInfo xmlns:p15="http://schemas.microsoft.com/office/powerpoint/2012/main" timeZoneBias="240"/>
+      </p:ext>
+    </p:extLst>
+  </p:cm>
+</p:cmLst>
+</file>
+
+<file path=ppt/comments/comment3.xml><?xml version="1.0" encoding="utf-8"?>
 <p:cmLst xmlns:a="http://schemas.openxmlformats.org/drawingml/2006/main" xmlns:r="http://schemas.openxmlformats.org/officeDocument/2006/relationships" xmlns:p="http://schemas.openxmlformats.org/presentationml/2006/main">
   <p:cm authorId="1" dt="2023-03-27T10:03:12.670" idx="3">
     <p:pos x="4288" y="1329"/>
@@ -159,39 +414,11 @@
 </p:cmLst>
 </file>
 
-<file path=ppt/comments/comment2.xml><?xml version="1.0" encoding="utf-8"?>
-<p:cmLst xmlns:a="http://schemas.openxmlformats.org/drawingml/2006/main" xmlns:r="http://schemas.openxmlformats.org/officeDocument/2006/relationships" xmlns:p="http://schemas.openxmlformats.org/presentationml/2006/main">
-  <p:cm authorId="1" dt="2023-03-27T10:04:11.385" idx="4">
-    <p:pos x="4205" y="1329"/>
-    <p:text>Game endstate reached via progressive difficulty, inherently contraining time/round limitations over subsequent round iterations. Static and Freeplay modes are also available, providing alternative limitations (or lack thereof).</p:text>
-    <p:extLst>
-      <p:ext uri="{C676402C-5697-4E1C-873F-D02D1690AC5C}">
-        <p15:threadingInfo xmlns:p15="http://schemas.microsoft.com/office/powerpoint/2012/main" timeZoneBias="240"/>
-      </p:ext>
-    </p:extLst>
-  </p:cm>
-</p:cmLst>
-</file>
-
-<file path=ppt/comments/comment3.xml><?xml version="1.0" encoding="utf-8"?>
-<p:cmLst xmlns:a="http://schemas.openxmlformats.org/drawingml/2006/main" xmlns:r="http://schemas.openxmlformats.org/officeDocument/2006/relationships" xmlns:p="http://schemas.openxmlformats.org/presentationml/2006/main">
-  <p:cm authorId="1" dt="2023-04-06T12:43:21.098" idx="11">
-    <p:pos x="4288" y="395"/>
-    <p:text>Six difficulty level and three game modes are currently available.</p:text>
-    <p:extLst>
-      <p:ext uri="{C676402C-5697-4E1C-873F-D02D1690AC5C}">
-        <p15:threadingInfo xmlns:p15="http://schemas.microsoft.com/office/powerpoint/2012/main" timeZoneBias="240"/>
-      </p:ext>
-    </p:extLst>
-  </p:cm>
-</p:cmLst>
-</file>
-
 <file path=ppt/comments/comment4.xml><?xml version="1.0" encoding="utf-8"?>
 <p:cmLst xmlns:a="http://schemas.openxmlformats.org/drawingml/2006/main" xmlns:r="http://schemas.openxmlformats.org/officeDocument/2006/relationships" xmlns:p="http://schemas.openxmlformats.org/presentationml/2006/main">
-  <p:cm authorId="1" dt="2023-04-06T11:48:07.510" idx="7">
-    <p:pos x="3663" y="1483"/>
-    <p:text>Tutorial documentation (instruction manual) provided, with the addition of free play mode to gain confidence. Interactive tutorial to be implemented in a future version.</p:text>
+  <p:cm authorId="1" dt="2023-09-19T10:20:12.192" idx="16">
+    <p:pos x="4300" y="1328"/>
+    <p:text>Correct responses result in the generation of a new field and associated query, as well as the addition of points to the user's score. Incorrect answers flash the response box red alongside an 'negative' audible cue. Certain incorrect responses will generate a helpful tip below the response box (e.g. submitting "3" instead of "three" will alert the user as to the required format of numbers).</p:text>
     <p:extLst>
       <p:ext uri="{C676402C-5697-4E1C-873F-D02D1690AC5C}">
         <p15:threadingInfo xmlns:p15="http://schemas.microsoft.com/office/powerpoint/2012/main" timeZoneBias="240"/>
@@ -203,9 +430,9 @@
 
 <file path=ppt/comments/comment5.xml><?xml version="1.0" encoding="utf-8"?>
 <p:cmLst xmlns:a="http://schemas.openxmlformats.org/drawingml/2006/main" xmlns:r="http://schemas.openxmlformats.org/officeDocument/2006/relationships" xmlns:p="http://schemas.openxmlformats.org/presentationml/2006/main">
-  <p:cm authorId="1" dt="2023-04-06T11:49:31.829" idx="8">
-    <p:pos x="4254" y="395"/>
-    <p:text>Programmatically possible, however fundamentally not suitable for the inteded gameplay.</p:text>
+  <p:cm authorId="1" dt="2023-03-27T10:04:11.385" idx="4">
+    <p:pos x="4205" y="1329"/>
+    <p:text>Game end state reached via progressive difficulty, inherently constraining time/round limitations over subsequent round iterations. Static and Freeplay modes are also available, providing alternative limitations (or lack thereof).</p:text>
     <p:extLst>
       <p:ext uri="{C676402C-5697-4E1C-873F-D02D1690AC5C}">
         <p15:threadingInfo xmlns:p15="http://schemas.microsoft.com/office/powerpoint/2012/main" timeZoneBias="240"/>
@@ -217,9 +444,9 @@
 
 <file path=ppt/comments/comment6.xml><?xml version="1.0" encoding="utf-8"?>
 <p:cmLst xmlns:a="http://schemas.openxmlformats.org/drawingml/2006/main" xmlns:r="http://schemas.openxmlformats.org/officeDocument/2006/relationships" xmlns:p="http://schemas.openxmlformats.org/presentationml/2006/main">
-  <p:cm authorId="1" dt="2023-04-06T11:50:44.291" idx="9">
-    <p:pos x="4224" y="395"/>
-    <p:text>Implemented text auto-sizing. The largest font point (to a degree) will always be utilized given the amount of text and available field space. Can manually scale elements smaller, though there exists no reason do to given the current permutation bounds.</p:text>
+  <p:cm authorId="1" dt="2023-09-19T10:26:22.422" idx="17">
+    <p:pos x="4263" y="1328"/>
+    <p:text>The user's current score and all-time high score are always displayed on the play field. Upon reaching a game's end state, if a new high score is reached, a corresponding message will be displayed. An accuracy rating (percentage of correct responses against the total number of submissions) is displayed when reaching a game over. Response speed is a co-factor in the accumulation of the user's overall score.</p:text>
     <p:extLst>
       <p:ext uri="{C676402C-5697-4E1C-873F-D02D1690AC5C}">
         <p15:threadingInfo xmlns:p15="http://schemas.microsoft.com/office/powerpoint/2012/main" timeZoneBias="240"/>
@@ -231,9 +458,12 @@
 
 <file path=ppt/comments/comment7.xml><?xml version="1.0" encoding="utf-8"?>
 <p:cmLst xmlns:a="http://schemas.openxmlformats.org/drawingml/2006/main" xmlns:r="http://schemas.openxmlformats.org/officeDocument/2006/relationships" xmlns:p="http://schemas.openxmlformats.org/presentationml/2006/main">
-  <p:cm authorId="1" dt="2023-04-07T17:08:05.117" idx="12">
-    <p:pos x="3994" y="395"/>
-    <p:text>Actual gameplay enagement timeplay is tracked (i.e. not including menus, etc.). Current implementation reminds user to take a break every 30 minutes, though does not prevent dismissal and continuance.</p:text>
+  <p:cm authorId="1" dt="2023-09-19T10:32:41.585" idx="18">
+    <p:pos x="4270" y="1328"/>
+    <p:text>Survey statement: "I would be interested in engaging with this product on my own time (e.g., if it were not required as part of an academic or professional development curriculum)."
+92.31% - agree or strongly agree
+7.69% - neither agree or disagree
+0% - disagree or strongly disagree</p:text>
     <p:extLst>
       <p:ext uri="{C676402C-5697-4E1C-873F-D02D1690AC5C}">
         <p15:threadingInfo xmlns:p15="http://schemas.microsoft.com/office/powerpoint/2012/main" timeZoneBias="240"/>
@@ -245,9 +475,12 @@
 
 <file path=ppt/comments/comment8.xml><?xml version="1.0" encoding="utf-8"?>
 <p:cmLst xmlns:a="http://schemas.openxmlformats.org/drawingml/2006/main" xmlns:r="http://schemas.openxmlformats.org/officeDocument/2006/relationships" xmlns:p="http://schemas.openxmlformats.org/presentationml/2006/main">
-  <p:cm authorId="1" dt="2023-04-06T11:54:56.223" idx="10">
-    <p:pos x="4344" y="395"/>
-    <p:text>WebGL browser caching utilized for individual player data, stored locally on the user's machine. A future revision could warrant exportation, aggregation, and therefore a redundancy, should leaderboards, PvP, etc. be indicated.</p:text>
+  <p:cm authorId="1" dt="2023-09-19T10:37:04.809" idx="20">
+    <p:pos x="4278" y="1328"/>
+    <p:text>Survey statement: "After initial engagement with the product, I would be interested in continued interaction (via additional rounds, subsequent game sessions, etc.)"
+92.31% - agree or strongly agree
+0% - neither agree or disagree
+7.69% - disagree or strongly disagree</p:text>
     <p:extLst>
       <p:ext uri="{C676402C-5697-4E1C-873F-D02D1690AC5C}">
         <p15:threadingInfo xmlns:p15="http://schemas.microsoft.com/office/powerpoint/2012/main" timeZoneBias="240"/>
@@ -255,6 +488,458 @@
     </p:extLst>
   </p:cm>
 </p:cmLst>
+</file>
+
+<file path=ppt/comments/comment9.xml><?xml version="1.0" encoding="utf-8"?>
+<p:cmLst xmlns:a="http://schemas.openxmlformats.org/drawingml/2006/main" xmlns:r="http://schemas.openxmlformats.org/officeDocument/2006/relationships" xmlns:p="http://schemas.openxmlformats.org/presentationml/2006/main">
+  <p:cm authorId="1" dt="2023-09-19T10:38:30.470" idx="21">
+    <p:pos x="4274" y="1328"/>
+    <p:text>Survey statement: "I successfully completed my initial game session (reached a game over state), answering at least one query correctly."
+100% - true
+0% - false</p:text>
+    <p:extLst>
+      <p:ext uri="{C676402C-5697-4E1C-873F-D02D1690AC5C}">
+        <p15:threadingInfo xmlns:p15="http://schemas.microsoft.com/office/powerpoint/2012/main" timeZoneBias="240"/>
+      </p:ext>
+    </p:extLst>
+  </p:cm>
+</p:cmLst>
+</file>
+
+<file path=ppt/notesMasters/notesMaster1.xml><?xml version="1.0" encoding="utf-8"?>
+<p:notesMaster xmlns:a="http://schemas.openxmlformats.org/drawingml/2006/main" xmlns:r="http://schemas.openxmlformats.org/officeDocument/2006/relationships" xmlns:p="http://schemas.openxmlformats.org/presentationml/2006/main">
+  <p:cSld>
+    <p:bg>
+      <p:bgRef idx="1001">
+        <a:schemeClr val="bg1"/>
+      </p:bgRef>
+    </p:bg>
+    <p:spTree>
+      <p:nvGrpSpPr>
+        <p:cNvPr id="1" name=""/>
+        <p:cNvGrpSpPr/>
+        <p:nvPr/>
+      </p:nvGrpSpPr>
+      <p:grpSpPr>
+        <a:xfrm>
+          <a:off x="0" y="0"/>
+          <a:ext cx="0" cy="0"/>
+          <a:chOff x="0" y="0"/>
+          <a:chExt cx="0" cy="0"/>
+        </a:xfrm>
+      </p:grpSpPr>
+      <p:sp>
+        <p:nvSpPr>
+          <p:cNvPr id="2" name="Header Placeholder 1"/>
+          <p:cNvSpPr>
+            <a:spLocks noGrp="1"/>
+          </p:cNvSpPr>
+          <p:nvPr>
+            <p:ph type="hdr" sz="quarter"/>
+          </p:nvPr>
+        </p:nvSpPr>
+        <p:spPr>
+          <a:xfrm>
+            <a:off x="0" y="0"/>
+            <a:ext cx="2971800" cy="458788"/>
+          </a:xfrm>
+          <a:prstGeom prst="rect">
+            <a:avLst/>
+          </a:prstGeom>
+        </p:spPr>
+        <p:txBody>
+          <a:bodyPr vert="horz" lIns="91440" tIns="45720" rIns="91440" bIns="45720" rtlCol="0"/>
+          <a:lstStyle>
+            <a:lvl1pPr algn="l">
+              <a:defRPr sz="1200"/>
+            </a:lvl1pPr>
+          </a:lstStyle>
+          <a:p>
+            <a:endParaRPr lang="en-US"/>
+          </a:p>
+        </p:txBody>
+      </p:sp>
+      <p:sp>
+        <p:nvSpPr>
+          <p:cNvPr id="3" name="Date Placeholder 2"/>
+          <p:cNvSpPr>
+            <a:spLocks noGrp="1"/>
+          </p:cNvSpPr>
+          <p:nvPr>
+            <p:ph type="dt" idx="1"/>
+          </p:nvPr>
+        </p:nvSpPr>
+        <p:spPr>
+          <a:xfrm>
+            <a:off x="3884613" y="0"/>
+            <a:ext cx="2971800" cy="458788"/>
+          </a:xfrm>
+          <a:prstGeom prst="rect">
+            <a:avLst/>
+          </a:prstGeom>
+        </p:spPr>
+        <p:txBody>
+          <a:bodyPr vert="horz" lIns="91440" tIns="45720" rIns="91440" bIns="45720" rtlCol="0"/>
+          <a:lstStyle>
+            <a:lvl1pPr algn="r">
+              <a:defRPr sz="1200"/>
+            </a:lvl1pPr>
+          </a:lstStyle>
+          <a:p>
+            <a:fld id="{E0D273C0-9348-4970-A347-563AEB9872CF}" type="datetimeFigureOut">
+              <a:rPr lang="en-US" smtClean="0"/>
+              <a:t>9/19/2023</a:t>
+            </a:fld>
+            <a:endParaRPr lang="en-US"/>
+          </a:p>
+        </p:txBody>
+      </p:sp>
+      <p:sp>
+        <p:nvSpPr>
+          <p:cNvPr id="4" name="Slide Image Placeholder 3"/>
+          <p:cNvSpPr>
+            <a:spLocks noGrp="1" noRot="1" noChangeAspect="1"/>
+          </p:cNvSpPr>
+          <p:nvPr>
+            <p:ph type="sldImg" idx="2"/>
+          </p:nvPr>
+        </p:nvSpPr>
+        <p:spPr>
+          <a:xfrm>
+            <a:off x="960438" y="1143000"/>
+            <a:ext cx="4937125" cy="3086100"/>
+          </a:xfrm>
+          <a:prstGeom prst="rect">
+            <a:avLst/>
+          </a:prstGeom>
+          <a:noFill/>
+          <a:ln w="12700">
+            <a:solidFill>
+              <a:prstClr val="black"/>
+            </a:solidFill>
+          </a:ln>
+        </p:spPr>
+        <p:txBody>
+          <a:bodyPr vert="horz" lIns="91440" tIns="45720" rIns="91440" bIns="45720" rtlCol="0" anchor="ctr"/>
+          <a:lstStyle/>
+          <a:p>
+            <a:endParaRPr lang="en-US"/>
+          </a:p>
+        </p:txBody>
+      </p:sp>
+      <p:sp>
+        <p:nvSpPr>
+          <p:cNvPr id="5" name="Notes Placeholder 4"/>
+          <p:cNvSpPr>
+            <a:spLocks noGrp="1"/>
+          </p:cNvSpPr>
+          <p:nvPr>
+            <p:ph type="body" sz="quarter" idx="3"/>
+          </p:nvPr>
+        </p:nvSpPr>
+        <p:spPr>
+          <a:xfrm>
+            <a:off x="685800" y="4400550"/>
+            <a:ext cx="5486400" cy="3600450"/>
+          </a:xfrm>
+          <a:prstGeom prst="rect">
+            <a:avLst/>
+          </a:prstGeom>
+        </p:spPr>
+        <p:txBody>
+          <a:bodyPr vert="horz" lIns="91440" tIns="45720" rIns="91440" bIns="45720" rtlCol="0"/>
+          <a:lstStyle/>
+          <a:p>
+            <a:pPr lvl="0"/>
+            <a:r>
+              <a:rPr lang="en-US"/>
+              <a:t>Click to edit Master text styles</a:t>
+            </a:r>
+          </a:p>
+          <a:p>
+            <a:pPr lvl="1"/>
+            <a:r>
+              <a:rPr lang="en-US"/>
+              <a:t>Second level</a:t>
+            </a:r>
+          </a:p>
+          <a:p>
+            <a:pPr lvl="2"/>
+            <a:r>
+              <a:rPr lang="en-US"/>
+              <a:t>Third level</a:t>
+            </a:r>
+          </a:p>
+          <a:p>
+            <a:pPr lvl="3"/>
+            <a:r>
+              <a:rPr lang="en-US"/>
+              <a:t>Fourth level</a:t>
+            </a:r>
+          </a:p>
+          <a:p>
+            <a:pPr lvl="4"/>
+            <a:r>
+              <a:rPr lang="en-US"/>
+              <a:t>Fifth level</a:t>
+            </a:r>
+          </a:p>
+        </p:txBody>
+      </p:sp>
+      <p:sp>
+        <p:nvSpPr>
+          <p:cNvPr id="6" name="Footer Placeholder 5"/>
+          <p:cNvSpPr>
+            <a:spLocks noGrp="1"/>
+          </p:cNvSpPr>
+          <p:nvPr>
+            <p:ph type="ftr" sz="quarter" idx="4"/>
+          </p:nvPr>
+        </p:nvSpPr>
+        <p:spPr>
+          <a:xfrm>
+            <a:off x="0" y="8685213"/>
+            <a:ext cx="2971800" cy="458787"/>
+          </a:xfrm>
+          <a:prstGeom prst="rect">
+            <a:avLst/>
+          </a:prstGeom>
+        </p:spPr>
+        <p:txBody>
+          <a:bodyPr vert="horz" lIns="91440" tIns="45720" rIns="91440" bIns="45720" rtlCol="0" anchor="b"/>
+          <a:lstStyle>
+            <a:lvl1pPr algn="l">
+              <a:defRPr sz="1200"/>
+            </a:lvl1pPr>
+          </a:lstStyle>
+          <a:p>
+            <a:endParaRPr lang="en-US"/>
+          </a:p>
+        </p:txBody>
+      </p:sp>
+      <p:sp>
+        <p:nvSpPr>
+          <p:cNvPr id="7" name="Slide Number Placeholder 6"/>
+          <p:cNvSpPr>
+            <a:spLocks noGrp="1"/>
+          </p:cNvSpPr>
+          <p:nvPr>
+            <p:ph type="sldNum" sz="quarter" idx="5"/>
+          </p:nvPr>
+        </p:nvSpPr>
+        <p:spPr>
+          <a:xfrm>
+            <a:off x="3884613" y="8685213"/>
+            <a:ext cx="2971800" cy="458787"/>
+          </a:xfrm>
+          <a:prstGeom prst="rect">
+            <a:avLst/>
+          </a:prstGeom>
+        </p:spPr>
+        <p:txBody>
+          <a:bodyPr vert="horz" lIns="91440" tIns="45720" rIns="91440" bIns="45720" rtlCol="0" anchor="b"/>
+          <a:lstStyle>
+            <a:lvl1pPr algn="r">
+              <a:defRPr sz="1200"/>
+            </a:lvl1pPr>
+          </a:lstStyle>
+          <a:p>
+            <a:fld id="{64A67DE2-9EBE-45DA-9E14-A0E56A16EDDC}" type="slidenum">
+              <a:rPr lang="en-US" smtClean="0"/>
+              <a:t>‹#›</a:t>
+            </a:fld>
+            <a:endParaRPr lang="en-US"/>
+          </a:p>
+        </p:txBody>
+      </p:sp>
+    </p:spTree>
+    <p:extLst>
+      <p:ext uri="{BB962C8B-B14F-4D97-AF65-F5344CB8AC3E}">
+        <p14:creationId xmlns:p14="http://schemas.microsoft.com/office/powerpoint/2010/main" val="1010398099"/>
+      </p:ext>
+    </p:extLst>
+  </p:cSld>
+  <p:clrMap bg1="lt1" tx1="dk1" bg2="lt2" tx2="dk2" accent1="accent1" accent2="accent2" accent3="accent3" accent4="accent4" accent5="accent5" accent6="accent6" hlink="hlink" folHlink="folHlink"/>
+  <p:notesStyle>
+    <a:lvl1pPr marL="0" algn="l" defTabSz="914400" rtl="0" eaLnBrk="1" latinLnBrk="0" hangingPunct="1">
+      <a:defRPr sz="1200" kern="1200">
+        <a:solidFill>
+          <a:schemeClr val="tx1"/>
+        </a:solidFill>
+        <a:latin typeface="+mn-lt"/>
+        <a:ea typeface="+mn-ea"/>
+        <a:cs typeface="+mn-cs"/>
+      </a:defRPr>
+    </a:lvl1pPr>
+    <a:lvl2pPr marL="457200" algn="l" defTabSz="914400" rtl="0" eaLnBrk="1" latinLnBrk="0" hangingPunct="1">
+      <a:defRPr sz="1200" kern="1200">
+        <a:solidFill>
+          <a:schemeClr val="tx1"/>
+        </a:solidFill>
+        <a:latin typeface="+mn-lt"/>
+        <a:ea typeface="+mn-ea"/>
+        <a:cs typeface="+mn-cs"/>
+      </a:defRPr>
+    </a:lvl2pPr>
+    <a:lvl3pPr marL="914400" algn="l" defTabSz="914400" rtl="0" eaLnBrk="1" latinLnBrk="0" hangingPunct="1">
+      <a:defRPr sz="1200" kern="1200">
+        <a:solidFill>
+          <a:schemeClr val="tx1"/>
+        </a:solidFill>
+        <a:latin typeface="+mn-lt"/>
+        <a:ea typeface="+mn-ea"/>
+        <a:cs typeface="+mn-cs"/>
+      </a:defRPr>
+    </a:lvl3pPr>
+    <a:lvl4pPr marL="1371600" algn="l" defTabSz="914400" rtl="0" eaLnBrk="1" latinLnBrk="0" hangingPunct="1">
+      <a:defRPr sz="1200" kern="1200">
+        <a:solidFill>
+          <a:schemeClr val="tx1"/>
+        </a:solidFill>
+        <a:latin typeface="+mn-lt"/>
+        <a:ea typeface="+mn-ea"/>
+        <a:cs typeface="+mn-cs"/>
+      </a:defRPr>
+    </a:lvl4pPr>
+    <a:lvl5pPr marL="1828800" algn="l" defTabSz="914400" rtl="0" eaLnBrk="1" latinLnBrk="0" hangingPunct="1">
+      <a:defRPr sz="1200" kern="1200">
+        <a:solidFill>
+          <a:schemeClr val="tx1"/>
+        </a:solidFill>
+        <a:latin typeface="+mn-lt"/>
+        <a:ea typeface="+mn-ea"/>
+        <a:cs typeface="+mn-cs"/>
+      </a:defRPr>
+    </a:lvl5pPr>
+    <a:lvl6pPr marL="2286000" algn="l" defTabSz="914400" rtl="0" eaLnBrk="1" latinLnBrk="0" hangingPunct="1">
+      <a:defRPr sz="1200" kern="1200">
+        <a:solidFill>
+          <a:schemeClr val="tx1"/>
+        </a:solidFill>
+        <a:latin typeface="+mn-lt"/>
+        <a:ea typeface="+mn-ea"/>
+        <a:cs typeface="+mn-cs"/>
+      </a:defRPr>
+    </a:lvl6pPr>
+    <a:lvl7pPr marL="2743200" algn="l" defTabSz="914400" rtl="0" eaLnBrk="1" latinLnBrk="0" hangingPunct="1">
+      <a:defRPr sz="1200" kern="1200">
+        <a:solidFill>
+          <a:schemeClr val="tx1"/>
+        </a:solidFill>
+        <a:latin typeface="+mn-lt"/>
+        <a:ea typeface="+mn-ea"/>
+        <a:cs typeface="+mn-cs"/>
+      </a:defRPr>
+    </a:lvl7pPr>
+    <a:lvl8pPr marL="3200400" algn="l" defTabSz="914400" rtl="0" eaLnBrk="1" latinLnBrk="0" hangingPunct="1">
+      <a:defRPr sz="1200" kern="1200">
+        <a:solidFill>
+          <a:schemeClr val="tx1"/>
+        </a:solidFill>
+        <a:latin typeface="+mn-lt"/>
+        <a:ea typeface="+mn-ea"/>
+        <a:cs typeface="+mn-cs"/>
+      </a:defRPr>
+    </a:lvl8pPr>
+    <a:lvl9pPr marL="3657600" algn="l" defTabSz="914400" rtl="0" eaLnBrk="1" latinLnBrk="0" hangingPunct="1">
+      <a:defRPr sz="1200" kern="1200">
+        <a:solidFill>
+          <a:schemeClr val="tx1"/>
+        </a:solidFill>
+        <a:latin typeface="+mn-lt"/>
+        <a:ea typeface="+mn-ea"/>
+        <a:cs typeface="+mn-cs"/>
+      </a:defRPr>
+    </a:lvl9pPr>
+  </p:notesStyle>
+</p:notesMaster>
+</file>
+
+<file path=ppt/notesSlides/notesSlide1.xml><?xml version="1.0" encoding="utf-8"?>
+<p:notes xmlns:a="http://schemas.openxmlformats.org/drawingml/2006/main" xmlns:r="http://schemas.openxmlformats.org/officeDocument/2006/relationships" xmlns:p="http://schemas.openxmlformats.org/presentationml/2006/main">
+  <p:cSld>
+    <p:spTree>
+      <p:nvGrpSpPr>
+        <p:cNvPr id="1" name=""/>
+        <p:cNvGrpSpPr/>
+        <p:nvPr/>
+      </p:nvGrpSpPr>
+      <p:grpSpPr>
+        <a:xfrm>
+          <a:off x="0" y="0"/>
+          <a:ext cx="0" cy="0"/>
+          <a:chOff x="0" y="0"/>
+          <a:chExt cx="0" cy="0"/>
+        </a:xfrm>
+      </p:grpSpPr>
+      <p:sp>
+        <p:nvSpPr>
+          <p:cNvPr id="2" name="Slide Image Placeholder 1"/>
+          <p:cNvSpPr>
+            <a:spLocks noGrp="1" noRot="1" noChangeAspect="1"/>
+          </p:cNvSpPr>
+          <p:nvPr>
+            <p:ph type="sldImg"/>
+          </p:nvPr>
+        </p:nvSpPr>
+        <p:spPr/>
+      </p:sp>
+      <p:sp>
+        <p:nvSpPr>
+          <p:cNvPr id="3" name="Notes Placeholder 2"/>
+          <p:cNvSpPr>
+            <a:spLocks noGrp="1"/>
+          </p:cNvSpPr>
+          <p:nvPr>
+            <p:ph type="body" idx="1"/>
+          </p:nvPr>
+        </p:nvSpPr>
+        <p:spPr/>
+        <p:txBody>
+          <a:bodyPr/>
+          <a:lstStyle/>
+          <a:p>
+            <a:r>
+              <a:rPr lang="en-US" dirty="0"/>
+              <a:t>Status dots: GREEN – pass, YELLOW – modified pass, ORANGE – not implemented, GREY – requires further testing</a:t>
+            </a:r>
+          </a:p>
+        </p:txBody>
+      </p:sp>
+      <p:sp>
+        <p:nvSpPr>
+          <p:cNvPr id="4" name="Slide Number Placeholder 3"/>
+          <p:cNvSpPr>
+            <a:spLocks noGrp="1"/>
+          </p:cNvSpPr>
+          <p:nvPr>
+            <p:ph type="sldNum" sz="quarter" idx="5"/>
+          </p:nvPr>
+        </p:nvSpPr>
+        <p:spPr/>
+        <p:txBody>
+          <a:bodyPr/>
+          <a:lstStyle/>
+          <a:p>
+            <a:fld id="{64A67DE2-9EBE-45DA-9E14-A0E56A16EDDC}" type="slidenum">
+              <a:rPr lang="en-US" smtClean="0"/>
+              <a:t>1</a:t>
+            </a:fld>
+            <a:endParaRPr lang="en-US"/>
+          </a:p>
+        </p:txBody>
+      </p:sp>
+    </p:spTree>
+    <p:extLst>
+      <p:ext uri="{BB962C8B-B14F-4D97-AF65-F5344CB8AC3E}">
+        <p14:creationId xmlns:p14="http://schemas.microsoft.com/office/powerpoint/2010/main" val="2409575720"/>
+      </p:ext>
+    </p:extLst>
+  </p:cSld>
+  <p:clrMapOvr>
+    <a:masterClrMapping/>
+  </p:clrMapOvr>
+</p:notes>
 </file>
 
 <file path=ppt/slideLayouts/slideLayout1.xml><?xml version="1.0" encoding="utf-8"?>
@@ -388,7 +1073,7 @@
           <a:p>
             <a:fld id="{F26EAA00-1F83-4303-9263-8C4B807B8531}" type="datetimeFigureOut">
               <a:rPr lang="en-US" smtClean="0"/>
-              <a:t>4/11/2023</a:t>
+              <a:t>9/19/2023</a:t>
             </a:fld>
             <a:endParaRPr lang="en-US"/>
           </a:p>
@@ -558,7 +1243,7 @@
           <a:p>
             <a:fld id="{F26EAA00-1F83-4303-9263-8C4B807B8531}" type="datetimeFigureOut">
               <a:rPr lang="en-US" smtClean="0"/>
-              <a:t>4/11/2023</a:t>
+              <a:t>9/19/2023</a:t>
             </a:fld>
             <a:endParaRPr lang="en-US"/>
           </a:p>
@@ -738,7 +1423,7 @@
           <a:p>
             <a:fld id="{F26EAA00-1F83-4303-9263-8C4B807B8531}" type="datetimeFigureOut">
               <a:rPr lang="en-US" smtClean="0"/>
-              <a:t>4/11/2023</a:t>
+              <a:t>9/19/2023</a:t>
             </a:fld>
             <a:endParaRPr lang="en-US"/>
           </a:p>
@@ -908,7 +1593,7 @@
           <a:p>
             <a:fld id="{F26EAA00-1F83-4303-9263-8C4B807B8531}" type="datetimeFigureOut">
               <a:rPr lang="en-US" smtClean="0"/>
-              <a:t>4/11/2023</a:t>
+              <a:t>9/19/2023</a:t>
             </a:fld>
             <a:endParaRPr lang="en-US"/>
           </a:p>
@@ -1154,7 +1839,7 @@
           <a:p>
             <a:fld id="{F26EAA00-1F83-4303-9263-8C4B807B8531}" type="datetimeFigureOut">
               <a:rPr lang="en-US" smtClean="0"/>
-              <a:t>4/11/2023</a:t>
+              <a:t>9/19/2023</a:t>
             </a:fld>
             <a:endParaRPr lang="en-US"/>
           </a:p>
@@ -1386,7 +2071,7 @@
           <a:p>
             <a:fld id="{F26EAA00-1F83-4303-9263-8C4B807B8531}" type="datetimeFigureOut">
               <a:rPr lang="en-US" smtClean="0"/>
-              <a:t>4/11/2023</a:t>
+              <a:t>9/19/2023</a:t>
             </a:fld>
             <a:endParaRPr lang="en-US"/>
           </a:p>
@@ -1753,7 +2438,7 @@
           <a:p>
             <a:fld id="{F26EAA00-1F83-4303-9263-8C4B807B8531}" type="datetimeFigureOut">
               <a:rPr lang="en-US" smtClean="0"/>
-              <a:t>4/11/2023</a:t>
+              <a:t>9/19/2023</a:t>
             </a:fld>
             <a:endParaRPr lang="en-US"/>
           </a:p>
@@ -1871,7 +2556,7 @@
           <a:p>
             <a:fld id="{F26EAA00-1F83-4303-9263-8C4B807B8531}" type="datetimeFigureOut">
               <a:rPr lang="en-US" smtClean="0"/>
-              <a:t>4/11/2023</a:t>
+              <a:t>9/19/2023</a:t>
             </a:fld>
             <a:endParaRPr lang="en-US"/>
           </a:p>
@@ -1966,7 +2651,7 @@
           <a:p>
             <a:fld id="{F26EAA00-1F83-4303-9263-8C4B807B8531}" type="datetimeFigureOut">
               <a:rPr lang="en-US" smtClean="0"/>
-              <a:t>4/11/2023</a:t>
+              <a:t>9/19/2023</a:t>
             </a:fld>
             <a:endParaRPr lang="en-US"/>
           </a:p>
@@ -2243,7 +2928,7 @@
           <a:p>
             <a:fld id="{F26EAA00-1F83-4303-9263-8C4B807B8531}" type="datetimeFigureOut">
               <a:rPr lang="en-US" smtClean="0"/>
-              <a:t>4/11/2023</a:t>
+              <a:t>9/19/2023</a:t>
             </a:fld>
             <a:endParaRPr lang="en-US"/>
           </a:p>
@@ -2500,7 +3185,7 @@
           <a:p>
             <a:fld id="{F26EAA00-1F83-4303-9263-8C4B807B8531}" type="datetimeFigureOut">
               <a:rPr lang="en-US" smtClean="0"/>
-              <a:t>4/11/2023</a:t>
+              <a:t>9/19/2023</a:t>
             </a:fld>
             <a:endParaRPr lang="en-US"/>
           </a:p>
@@ -2713,7 +3398,7 @@
           <a:p>
             <a:fld id="{F26EAA00-1F83-4303-9263-8C4B807B8531}" type="datetimeFigureOut">
               <a:rPr lang="en-US" smtClean="0"/>
-              <a:t>4/11/2023</a:t>
+              <a:t>9/19/2023</a:t>
             </a:fld>
             <a:endParaRPr lang="en-US"/>
           </a:p>
@@ -3107,7 +3792,7 @@
     <p:bg>
       <p:bgPr>
         <a:blipFill dpi="0" rotWithShape="1">
-          <a:blip r:embed="rId2">
+          <a:blip r:embed="rId3">
             <a:lum/>
           </a:blip>
           <a:srcRect/>
@@ -4490,7 +5175,7 @@
           <a:lstStyle/>
           <a:p>
             <a:pPr algn="ctr"/>
-            <a:endParaRPr lang="en-US"/>
+            <a:endParaRPr lang="en-US" dirty="0"/>
           </a:p>
         </p:txBody>
       </p:sp>
@@ -9827,7 +10512,9 @@
             <a:avLst/>
           </a:prstGeom>
           <a:solidFill>
-            <a:schemeClr val="accent3"/>
+            <a:schemeClr val="bg1">
+              <a:lumMod val="65000"/>
+            </a:schemeClr>
           </a:solidFill>
           <a:ln>
             <a:noFill/>
@@ -12578,7 +13265,7 @@
             <a:avLst/>
           </a:prstGeom>
           <a:solidFill>
-            <a:schemeClr val="accent3"/>
+            <a:schemeClr val="accent6"/>
           </a:solidFill>
           <a:ln>
             <a:noFill/>
@@ -15278,7 +15965,7 @@
             <a:avLst/>
           </a:prstGeom>
           <a:solidFill>
-            <a:schemeClr val="accent3"/>
+            <a:schemeClr val="accent6"/>
           </a:solidFill>
           <a:ln>
             <a:noFill/>
@@ -16180,7 +16867,7 @@
             <a:avLst/>
           </a:prstGeom>
           <a:solidFill>
-            <a:schemeClr val="accent3"/>
+            <a:schemeClr val="accent6"/>
           </a:solidFill>
           <a:ln>
             <a:noFill/>
@@ -19759,7 +20446,7 @@
         </p:nvSpPr>
         <p:spPr>
           <a:xfrm>
-            <a:off x="6835147" y="118708"/>
+            <a:off x="6835147" y="142004"/>
             <a:ext cx="338554" cy="338554"/>
           </a:xfrm>
           <a:prstGeom prst="ellipse">
@@ -20657,7 +21344,7 @@
             <a:avLst/>
           </a:prstGeom>
           <a:solidFill>
-            <a:schemeClr val="accent3"/>
+            <a:schemeClr val="accent6"/>
           </a:solidFill>
           <a:ln>
             <a:noFill/>
@@ -20682,7 +21369,7 @@
           <a:lstStyle/>
           <a:p>
             <a:pPr algn="ctr"/>
-            <a:endParaRPr lang="en-US"/>
+            <a:endParaRPr lang="en-US" dirty="0"/>
           </a:p>
         </p:txBody>
       </p:sp>
@@ -21081,7 +21768,7 @@
                 <a:ea typeface="+mn-ea"/>
                 <a:cs typeface="+mn-cs"/>
               </a:rPr>
-              <a:t>Provided a random, representative sample of the engaged target population, a large majority of users  (&gt;75%) will, of their own volition, demonstrate reuse of the product.  </a:t>
+              <a:t>Provided a random, representative sample of the engaged target population, a large majority of users (&gt;75%) will, of their own volition, demonstrate reuse of the product.  </a:t>
             </a:r>
           </a:p>
         </p:txBody>
@@ -21568,7 +22255,7 @@
             <a:avLst/>
           </a:prstGeom>
           <a:solidFill>
-            <a:schemeClr val="accent3"/>
+            <a:schemeClr val="accent6"/>
           </a:solidFill>
           <a:ln>
             <a:noFill/>
@@ -22479,7 +23166,7 @@
             <a:avLst/>
           </a:prstGeom>
           <a:solidFill>
-            <a:schemeClr val="accent3"/>
+            <a:schemeClr val="accent6"/>
           </a:solidFill>
           <a:ln>
             <a:noFill/>
@@ -22780,4 +23467,299 @@
     </a:ext>
   </a:extLst>
 </a:theme>
+</file>
+
+<file path=ppt/theme/theme2.xml><?xml version="1.0" encoding="utf-8"?>
+<a:theme xmlns:a="http://schemas.openxmlformats.org/drawingml/2006/main" name="Office Theme">
+  <a:themeElements>
+    <a:clrScheme name="Office">
+      <a:dk1>
+        <a:sysClr val="windowText" lastClr="000000"/>
+      </a:dk1>
+      <a:lt1>
+        <a:sysClr val="window" lastClr="FFFFFF"/>
+      </a:lt1>
+      <a:dk2>
+        <a:srgbClr val="44546A"/>
+      </a:dk2>
+      <a:lt2>
+        <a:srgbClr val="E7E6E6"/>
+      </a:lt2>
+      <a:accent1>
+        <a:srgbClr val="4472C4"/>
+      </a:accent1>
+      <a:accent2>
+        <a:srgbClr val="ED7D31"/>
+      </a:accent2>
+      <a:accent3>
+        <a:srgbClr val="A5A5A5"/>
+      </a:accent3>
+      <a:accent4>
+        <a:srgbClr val="FFC000"/>
+      </a:accent4>
+      <a:accent5>
+        <a:srgbClr val="5B9BD5"/>
+      </a:accent5>
+      <a:accent6>
+        <a:srgbClr val="70AD47"/>
+      </a:accent6>
+      <a:hlink>
+        <a:srgbClr val="0563C1"/>
+      </a:hlink>
+      <a:folHlink>
+        <a:srgbClr val="954F72"/>
+      </a:folHlink>
+    </a:clrScheme>
+    <a:fontScheme name="Office">
+      <a:majorFont>
+        <a:latin typeface="Calibri Light" panose="020F0302020204030204"/>
+        <a:ea typeface=""/>
+        <a:cs typeface=""/>
+        <a:font script="Jpan" typeface="游ゴシック Light"/>
+        <a:font script="Hang" typeface="맑은 고딕"/>
+        <a:font script="Hans" typeface="等线 Light"/>
+        <a:font script="Hant" typeface="新細明體"/>
+        <a:font script="Arab" typeface="Times New Roman"/>
+        <a:font script="Hebr" typeface="Times New Roman"/>
+        <a:font script="Thai" typeface="Angsana New"/>
+        <a:font script="Ethi" typeface="Nyala"/>
+        <a:font script="Beng" typeface="Vrinda"/>
+        <a:font script="Gujr" typeface="Shruti"/>
+        <a:font script="Khmr" typeface="MoolBoran"/>
+        <a:font script="Knda" typeface="Tunga"/>
+        <a:font script="Guru" typeface="Raavi"/>
+        <a:font script="Cans" typeface="Euphemia"/>
+        <a:font script="Cher" typeface="Plantagenet Cherokee"/>
+        <a:font script="Yiii" typeface="Microsoft Yi Baiti"/>
+        <a:font script="Tibt" typeface="Microsoft Himalaya"/>
+        <a:font script="Thaa" typeface="MV Boli"/>
+        <a:font script="Deva" typeface="Mangal"/>
+        <a:font script="Telu" typeface="Gautami"/>
+        <a:font script="Taml" typeface="Latha"/>
+        <a:font script="Syrc" typeface="Estrangelo Edessa"/>
+        <a:font script="Orya" typeface="Kalinga"/>
+        <a:font script="Mlym" typeface="Kartika"/>
+        <a:font script="Laoo" typeface="DokChampa"/>
+        <a:font script="Sinh" typeface="Iskoola Pota"/>
+        <a:font script="Mong" typeface="Mongolian Baiti"/>
+        <a:font script="Viet" typeface="Times New Roman"/>
+        <a:font script="Uigh" typeface="Microsoft Uighur"/>
+        <a:font script="Geor" typeface="Sylfaen"/>
+        <a:font script="Armn" typeface="Arial"/>
+        <a:font script="Bugi" typeface="Leelawadee UI"/>
+        <a:font script="Bopo" typeface="Microsoft JhengHei"/>
+        <a:font script="Java" typeface="Javanese Text"/>
+        <a:font script="Lisu" typeface="Segoe UI"/>
+        <a:font script="Mymr" typeface="Myanmar Text"/>
+        <a:font script="Nkoo" typeface="Ebrima"/>
+        <a:font script="Olck" typeface="Nirmala UI"/>
+        <a:font script="Osma" typeface="Ebrima"/>
+        <a:font script="Phag" typeface="Phagspa"/>
+        <a:font script="Syrn" typeface="Estrangelo Edessa"/>
+        <a:font script="Syrj" typeface="Estrangelo Edessa"/>
+        <a:font script="Syre" typeface="Estrangelo Edessa"/>
+        <a:font script="Sora" typeface="Nirmala UI"/>
+        <a:font script="Tale" typeface="Microsoft Tai Le"/>
+        <a:font script="Talu" typeface="Microsoft New Tai Lue"/>
+        <a:font script="Tfng" typeface="Ebrima"/>
+      </a:majorFont>
+      <a:minorFont>
+        <a:latin typeface="Calibri" panose="020F0502020204030204"/>
+        <a:ea typeface=""/>
+        <a:cs typeface=""/>
+        <a:font script="Jpan" typeface="游ゴシック"/>
+        <a:font script="Hang" typeface="맑은 고딕"/>
+        <a:font script="Hans" typeface="等线"/>
+        <a:font script="Hant" typeface="新細明體"/>
+        <a:font script="Arab" typeface="Arial"/>
+        <a:font script="Hebr" typeface="Arial"/>
+        <a:font script="Thai" typeface="Cordia New"/>
+        <a:font script="Ethi" typeface="Nyala"/>
+        <a:font script="Beng" typeface="Vrinda"/>
+        <a:font script="Gujr" typeface="Shruti"/>
+        <a:font script="Khmr" typeface="DaunPenh"/>
+        <a:font script="Knda" typeface="Tunga"/>
+        <a:font script="Guru" typeface="Raavi"/>
+        <a:font script="Cans" typeface="Euphemia"/>
+        <a:font script="Cher" typeface="Plantagenet Cherokee"/>
+        <a:font script="Yiii" typeface="Microsoft Yi Baiti"/>
+        <a:font script="Tibt" typeface="Microsoft Himalaya"/>
+        <a:font script="Thaa" typeface="MV Boli"/>
+        <a:font script="Deva" typeface="Mangal"/>
+        <a:font script="Telu" typeface="Gautami"/>
+        <a:font script="Taml" typeface="Latha"/>
+        <a:font script="Syrc" typeface="Estrangelo Edessa"/>
+        <a:font script="Orya" typeface="Kalinga"/>
+        <a:font script="Mlym" typeface="Kartika"/>
+        <a:font script="Laoo" typeface="DokChampa"/>
+        <a:font script="Sinh" typeface="Iskoola Pota"/>
+        <a:font script="Mong" typeface="Mongolian Baiti"/>
+        <a:font script="Viet" typeface="Arial"/>
+        <a:font script="Uigh" typeface="Microsoft Uighur"/>
+        <a:font script="Geor" typeface="Sylfaen"/>
+        <a:font script="Armn" typeface="Arial"/>
+        <a:font script="Bugi" typeface="Leelawadee UI"/>
+        <a:font script="Bopo" typeface="Microsoft JhengHei"/>
+        <a:font script="Java" typeface="Javanese Text"/>
+        <a:font script="Lisu" typeface="Segoe UI"/>
+        <a:font script="Mymr" typeface="Myanmar Text"/>
+        <a:font script="Nkoo" typeface="Ebrima"/>
+        <a:font script="Olck" typeface="Nirmala UI"/>
+        <a:font script="Osma" typeface="Ebrima"/>
+        <a:font script="Phag" typeface="Phagspa"/>
+        <a:font script="Syrn" typeface="Estrangelo Edessa"/>
+        <a:font script="Syrj" typeface="Estrangelo Edessa"/>
+        <a:font script="Syre" typeface="Estrangelo Edessa"/>
+        <a:font script="Sora" typeface="Nirmala UI"/>
+        <a:font script="Tale" typeface="Microsoft Tai Le"/>
+        <a:font script="Talu" typeface="Microsoft New Tai Lue"/>
+        <a:font script="Tfng" typeface="Ebrima"/>
+      </a:minorFont>
+    </a:fontScheme>
+    <a:fmtScheme name="Office">
+      <a:fillStyleLst>
+        <a:solidFill>
+          <a:schemeClr val="phClr"/>
+        </a:solidFill>
+        <a:gradFill rotWithShape="1">
+          <a:gsLst>
+            <a:gs pos="0">
+              <a:schemeClr val="phClr">
+                <a:lumMod val="110000"/>
+                <a:satMod val="105000"/>
+                <a:tint val="67000"/>
+              </a:schemeClr>
+            </a:gs>
+            <a:gs pos="50000">
+              <a:schemeClr val="phClr">
+                <a:lumMod val="105000"/>
+                <a:satMod val="103000"/>
+                <a:tint val="73000"/>
+              </a:schemeClr>
+            </a:gs>
+            <a:gs pos="100000">
+              <a:schemeClr val="phClr">
+                <a:lumMod val="105000"/>
+                <a:satMod val="109000"/>
+                <a:tint val="81000"/>
+              </a:schemeClr>
+            </a:gs>
+          </a:gsLst>
+          <a:lin ang="5400000" scaled="0"/>
+        </a:gradFill>
+        <a:gradFill rotWithShape="1">
+          <a:gsLst>
+            <a:gs pos="0">
+              <a:schemeClr val="phClr">
+                <a:satMod val="103000"/>
+                <a:lumMod val="102000"/>
+                <a:tint val="94000"/>
+              </a:schemeClr>
+            </a:gs>
+            <a:gs pos="50000">
+              <a:schemeClr val="phClr">
+                <a:satMod val="110000"/>
+                <a:lumMod val="100000"/>
+                <a:shade val="100000"/>
+              </a:schemeClr>
+            </a:gs>
+            <a:gs pos="100000">
+              <a:schemeClr val="phClr">
+                <a:lumMod val="99000"/>
+                <a:satMod val="120000"/>
+                <a:shade val="78000"/>
+              </a:schemeClr>
+            </a:gs>
+          </a:gsLst>
+          <a:lin ang="5400000" scaled="0"/>
+        </a:gradFill>
+      </a:fillStyleLst>
+      <a:lnStyleLst>
+        <a:ln w="6350" cap="flat" cmpd="sng" algn="ctr">
+          <a:solidFill>
+            <a:schemeClr val="phClr"/>
+          </a:solidFill>
+          <a:prstDash val="solid"/>
+          <a:miter lim="800000"/>
+        </a:ln>
+        <a:ln w="12700" cap="flat" cmpd="sng" algn="ctr">
+          <a:solidFill>
+            <a:schemeClr val="phClr"/>
+          </a:solidFill>
+          <a:prstDash val="solid"/>
+          <a:miter lim="800000"/>
+        </a:ln>
+        <a:ln w="19050" cap="flat" cmpd="sng" algn="ctr">
+          <a:solidFill>
+            <a:schemeClr val="phClr"/>
+          </a:solidFill>
+          <a:prstDash val="solid"/>
+          <a:miter lim="800000"/>
+        </a:ln>
+      </a:lnStyleLst>
+      <a:effectStyleLst>
+        <a:effectStyle>
+          <a:effectLst/>
+        </a:effectStyle>
+        <a:effectStyle>
+          <a:effectLst/>
+        </a:effectStyle>
+        <a:effectStyle>
+          <a:effectLst>
+            <a:outerShdw blurRad="57150" dist="19050" dir="5400000" algn="ctr" rotWithShape="0">
+              <a:srgbClr val="000000">
+                <a:alpha val="63000"/>
+              </a:srgbClr>
+            </a:outerShdw>
+          </a:effectLst>
+        </a:effectStyle>
+      </a:effectStyleLst>
+      <a:bgFillStyleLst>
+        <a:solidFill>
+          <a:schemeClr val="phClr"/>
+        </a:solidFill>
+        <a:solidFill>
+          <a:schemeClr val="phClr">
+            <a:tint val="95000"/>
+            <a:satMod val="170000"/>
+          </a:schemeClr>
+        </a:solidFill>
+        <a:gradFill rotWithShape="1">
+          <a:gsLst>
+            <a:gs pos="0">
+              <a:schemeClr val="phClr">
+                <a:tint val="93000"/>
+                <a:satMod val="150000"/>
+                <a:shade val="98000"/>
+                <a:lumMod val="102000"/>
+              </a:schemeClr>
+            </a:gs>
+            <a:gs pos="50000">
+              <a:schemeClr val="phClr">
+                <a:tint val="98000"/>
+                <a:satMod val="130000"/>
+                <a:shade val="90000"/>
+                <a:lumMod val="103000"/>
+              </a:schemeClr>
+            </a:gs>
+            <a:gs pos="100000">
+              <a:schemeClr val="phClr">
+                <a:shade val="63000"/>
+                <a:satMod val="120000"/>
+              </a:schemeClr>
+            </a:gs>
+          </a:gsLst>
+          <a:lin ang="5400000" scaled="0"/>
+        </a:gradFill>
+      </a:bgFillStyleLst>
+    </a:fmtScheme>
+  </a:themeElements>
+  <a:objectDefaults/>
+  <a:extraClrSchemeLst/>
+  <a:extLst>
+    <a:ext uri="{05A4C25C-085E-4340-85A3-A5531E510DB2}">
+      <thm15:themeFamily xmlns:thm15="http://schemas.microsoft.com/office/thememl/2012/main" name="Office Theme" id="{62F939B6-93AF-4DB8-9C6B-D6C7DFDC589F}" vid="{4A3C46E8-61CC-4603-A589-7422A47A8E4A}"/>
+    </a:ext>
+  </a:extLst>
+</a:theme>
 </file>
</xml_diff>